<commit_message>
wrote up light as particles
</commit_message>
<xml_diff>
--- a/qm/double-slit.pptx
+++ b/qm/double-slit.pptx
@@ -198,7 +198,7 @@
           <a:p>
             <a:fld id="{4D8C7975-7758-2A45-89D3-3D92B788EE9F}" type="datetimeFigureOut">
               <a:rPr lang="en-US" smtClean="0"/>
-              <a:t>11/25/25</a:t>
+              <a:t>11/28/25</a:t>
             </a:fld>
             <a:endParaRPr lang="en-US"/>
           </a:p>
@@ -696,7 +696,7 @@
           <a:p>
             <a:fld id="{6F302925-4665-5F46-8E77-D7976938C888}" type="datetimeFigureOut">
               <a:rPr lang="en-US" smtClean="0"/>
-              <a:t>11/25/25</a:t>
+              <a:t>11/28/25</a:t>
             </a:fld>
             <a:endParaRPr lang="en-US"/>
           </a:p>
@@ -894,7 +894,7 @@
           <a:p>
             <a:fld id="{6F302925-4665-5F46-8E77-D7976938C888}" type="datetimeFigureOut">
               <a:rPr lang="en-US" smtClean="0"/>
-              <a:t>11/25/25</a:t>
+              <a:t>11/28/25</a:t>
             </a:fld>
             <a:endParaRPr lang="en-US"/>
           </a:p>
@@ -1102,7 +1102,7 @@
           <a:p>
             <a:fld id="{6F302925-4665-5F46-8E77-D7976938C888}" type="datetimeFigureOut">
               <a:rPr lang="en-US" smtClean="0"/>
-              <a:t>11/25/25</a:t>
+              <a:t>11/28/25</a:t>
             </a:fld>
             <a:endParaRPr lang="en-US"/>
           </a:p>
@@ -1300,7 +1300,7 @@
           <a:p>
             <a:fld id="{6F302925-4665-5F46-8E77-D7976938C888}" type="datetimeFigureOut">
               <a:rPr lang="en-US" smtClean="0"/>
-              <a:t>11/25/25</a:t>
+              <a:t>11/28/25</a:t>
             </a:fld>
             <a:endParaRPr lang="en-US"/>
           </a:p>
@@ -1575,7 +1575,7 @@
           <a:p>
             <a:fld id="{6F302925-4665-5F46-8E77-D7976938C888}" type="datetimeFigureOut">
               <a:rPr lang="en-US" smtClean="0"/>
-              <a:t>11/25/25</a:t>
+              <a:t>11/28/25</a:t>
             </a:fld>
             <a:endParaRPr lang="en-US"/>
           </a:p>
@@ -1840,7 +1840,7 @@
           <a:p>
             <a:fld id="{6F302925-4665-5F46-8E77-D7976938C888}" type="datetimeFigureOut">
               <a:rPr lang="en-US" smtClean="0"/>
-              <a:t>11/25/25</a:t>
+              <a:t>11/28/25</a:t>
             </a:fld>
             <a:endParaRPr lang="en-US"/>
           </a:p>
@@ -2252,7 +2252,7 @@
           <a:p>
             <a:fld id="{6F302925-4665-5F46-8E77-D7976938C888}" type="datetimeFigureOut">
               <a:rPr lang="en-US" smtClean="0"/>
-              <a:t>11/25/25</a:t>
+              <a:t>11/28/25</a:t>
             </a:fld>
             <a:endParaRPr lang="en-US"/>
           </a:p>
@@ -2393,7 +2393,7 @@
           <a:p>
             <a:fld id="{6F302925-4665-5F46-8E77-D7976938C888}" type="datetimeFigureOut">
               <a:rPr lang="en-US" smtClean="0"/>
-              <a:t>11/25/25</a:t>
+              <a:t>11/28/25</a:t>
             </a:fld>
             <a:endParaRPr lang="en-US"/>
           </a:p>
@@ -2506,7 +2506,7 @@
           <a:p>
             <a:fld id="{6F302925-4665-5F46-8E77-D7976938C888}" type="datetimeFigureOut">
               <a:rPr lang="en-US" smtClean="0"/>
-              <a:t>11/25/25</a:t>
+              <a:t>11/28/25</a:t>
             </a:fld>
             <a:endParaRPr lang="en-US"/>
           </a:p>
@@ -2817,7 +2817,7 @@
           <a:p>
             <a:fld id="{6F302925-4665-5F46-8E77-D7976938C888}" type="datetimeFigureOut">
               <a:rPr lang="en-US" smtClean="0"/>
-              <a:t>11/25/25</a:t>
+              <a:t>11/28/25</a:t>
             </a:fld>
             <a:endParaRPr lang="en-US"/>
           </a:p>
@@ -3105,7 +3105,7 @@
           <a:p>
             <a:fld id="{6F302925-4665-5F46-8E77-D7976938C888}" type="datetimeFigureOut">
               <a:rPr lang="en-US" smtClean="0"/>
-              <a:t>11/25/25</a:t>
+              <a:t>11/28/25</a:t>
             </a:fld>
             <a:endParaRPr lang="en-US"/>
           </a:p>
@@ -3346,7 +3346,7 @@
           <a:p>
             <a:fld id="{6F302925-4665-5F46-8E77-D7976938C888}" type="datetimeFigureOut">
               <a:rPr lang="en-US" smtClean="0"/>
-              <a:t>11/25/25</a:t>
+              <a:t>11/28/25</a:t>
             </a:fld>
             <a:endParaRPr lang="en-US"/>
           </a:p>
@@ -3769,12 +3769,1172 @@
           <a:chExt cx="0" cy="0"/>
         </a:xfrm>
       </p:grpSpPr>
+      <p:sp>
+        <p:nvSpPr>
+          <p:cNvPr id="52" name="Rectangle 51">
+            <a:extLst>
+              <a:ext uri="{FF2B5EF4-FFF2-40B4-BE49-F238E27FC236}">
+                <a16:creationId xmlns:a16="http://schemas.microsoft.com/office/drawing/2014/main" id="{9BE6C25C-C16E-45C6-A8E8-BA6195A5A518}"/>
+              </a:ext>
+            </a:extLst>
+          </p:cNvPr>
+          <p:cNvSpPr/>
+          <p:nvPr/>
+        </p:nvSpPr>
+        <p:spPr>
+          <a:xfrm>
+            <a:off x="2759620" y="704277"/>
+            <a:ext cx="324009" cy="2749528"/>
+          </a:xfrm>
+          <a:prstGeom prst="rect">
+            <a:avLst/>
+          </a:prstGeom>
+          <a:solidFill>
+            <a:schemeClr val="tx1">
+              <a:lumMod val="50000"/>
+              <a:lumOff val="50000"/>
+            </a:schemeClr>
+          </a:solidFill>
+        </p:spPr>
+        <p:style>
+          <a:lnRef idx="2">
+            <a:schemeClr val="accent3">
+              <a:shade val="15000"/>
+            </a:schemeClr>
+          </a:lnRef>
+          <a:fillRef idx="1">
+            <a:schemeClr val="accent3"/>
+          </a:fillRef>
+          <a:effectRef idx="0">
+            <a:schemeClr val="accent3"/>
+          </a:effectRef>
+          <a:fontRef idx="minor">
+            <a:schemeClr val="lt1"/>
+          </a:fontRef>
+        </p:style>
+        <p:txBody>
+          <a:bodyPr rtlCol="0" anchor="ctr"/>
+          <a:lstStyle/>
+          <a:p>
+            <a:pPr algn="ctr"/>
+            <a:endParaRPr lang="en-US"/>
+          </a:p>
+        </p:txBody>
+      </p:sp>
+      <p:sp>
+        <p:nvSpPr>
+          <p:cNvPr id="53" name="Rectangle 52">
+            <a:extLst>
+              <a:ext uri="{FF2B5EF4-FFF2-40B4-BE49-F238E27FC236}">
+                <a16:creationId xmlns:a16="http://schemas.microsoft.com/office/drawing/2014/main" id="{6B192779-C53B-9F4C-47CF-17221D6199E8}"/>
+              </a:ext>
+            </a:extLst>
+          </p:cNvPr>
+          <p:cNvSpPr/>
+          <p:nvPr/>
+        </p:nvSpPr>
+        <p:spPr>
+          <a:xfrm>
+            <a:off x="4684727" y="704277"/>
+            <a:ext cx="324009" cy="2749528"/>
+          </a:xfrm>
+          <a:prstGeom prst="rect">
+            <a:avLst/>
+          </a:prstGeom>
+          <a:solidFill>
+            <a:schemeClr val="tx1">
+              <a:lumMod val="50000"/>
+              <a:lumOff val="50000"/>
+            </a:schemeClr>
+          </a:solidFill>
+        </p:spPr>
+        <p:style>
+          <a:lnRef idx="2">
+            <a:schemeClr val="accent3">
+              <a:shade val="15000"/>
+            </a:schemeClr>
+          </a:lnRef>
+          <a:fillRef idx="1">
+            <a:schemeClr val="accent3"/>
+          </a:fillRef>
+          <a:effectRef idx="0">
+            <a:schemeClr val="accent3"/>
+          </a:effectRef>
+          <a:fontRef idx="minor">
+            <a:schemeClr val="lt1"/>
+          </a:fontRef>
+        </p:style>
+        <p:txBody>
+          <a:bodyPr rtlCol="0" anchor="ctr"/>
+          <a:lstStyle/>
+          <a:p>
+            <a:pPr algn="ctr"/>
+            <a:endParaRPr lang="en-US"/>
+          </a:p>
+        </p:txBody>
+      </p:sp>
+      <p:sp>
+        <p:nvSpPr>
+          <p:cNvPr id="54" name="Rectangle 53">
+            <a:extLst>
+              <a:ext uri="{FF2B5EF4-FFF2-40B4-BE49-F238E27FC236}">
+                <a16:creationId xmlns:a16="http://schemas.microsoft.com/office/drawing/2014/main" id="{F3C65449-2460-9B9D-29E2-49A9C916D5FC}"/>
+              </a:ext>
+            </a:extLst>
+          </p:cNvPr>
+          <p:cNvSpPr/>
+          <p:nvPr/>
+        </p:nvSpPr>
+        <p:spPr>
+          <a:xfrm>
+            <a:off x="2407021" y="1399085"/>
+            <a:ext cx="1027733" cy="306805"/>
+          </a:xfrm>
+          <a:prstGeom prst="rect">
+            <a:avLst/>
+          </a:prstGeom>
+          <a:solidFill>
+            <a:schemeClr val="bg1"/>
+          </a:solidFill>
+          <a:ln>
+            <a:noFill/>
+          </a:ln>
+        </p:spPr>
+        <p:style>
+          <a:lnRef idx="2">
+            <a:schemeClr val="accent1">
+              <a:shade val="15000"/>
+            </a:schemeClr>
+          </a:lnRef>
+          <a:fillRef idx="1">
+            <a:schemeClr val="accent1"/>
+          </a:fillRef>
+          <a:effectRef idx="0">
+            <a:schemeClr val="accent1"/>
+          </a:effectRef>
+          <a:fontRef idx="minor">
+            <a:schemeClr val="lt1"/>
+          </a:fontRef>
+        </p:style>
+        <p:txBody>
+          <a:bodyPr rtlCol="0" anchor="ctr"/>
+          <a:lstStyle/>
+          <a:p>
+            <a:pPr algn="ctr"/>
+            <a:endParaRPr lang="en-US"/>
+          </a:p>
+        </p:txBody>
+      </p:sp>
+      <p:sp>
+        <p:nvSpPr>
+          <p:cNvPr id="55" name="Rectangle 54">
+            <a:extLst>
+              <a:ext uri="{FF2B5EF4-FFF2-40B4-BE49-F238E27FC236}">
+                <a16:creationId xmlns:a16="http://schemas.microsoft.com/office/drawing/2014/main" id="{7AEEA9C3-0E04-77EF-CE9E-C01FF116BD6C}"/>
+              </a:ext>
+            </a:extLst>
+          </p:cNvPr>
+          <p:cNvSpPr/>
+          <p:nvPr/>
+        </p:nvSpPr>
+        <p:spPr>
+          <a:xfrm>
+            <a:off x="2407020" y="2400698"/>
+            <a:ext cx="929614" cy="393714"/>
+          </a:xfrm>
+          <a:prstGeom prst="rect">
+            <a:avLst/>
+          </a:prstGeom>
+          <a:solidFill>
+            <a:schemeClr val="bg1"/>
+          </a:solidFill>
+          <a:ln>
+            <a:noFill/>
+          </a:ln>
+        </p:spPr>
+        <p:style>
+          <a:lnRef idx="2">
+            <a:schemeClr val="accent1">
+              <a:shade val="15000"/>
+            </a:schemeClr>
+          </a:lnRef>
+          <a:fillRef idx="1">
+            <a:schemeClr val="accent1"/>
+          </a:fillRef>
+          <a:effectRef idx="0">
+            <a:schemeClr val="accent1"/>
+          </a:effectRef>
+          <a:fontRef idx="minor">
+            <a:schemeClr val="lt1"/>
+          </a:fontRef>
+        </p:style>
+        <p:txBody>
+          <a:bodyPr rtlCol="0" anchor="ctr"/>
+          <a:lstStyle/>
+          <a:p>
+            <a:pPr algn="ctr"/>
+            <a:endParaRPr lang="en-US"/>
+          </a:p>
+        </p:txBody>
+      </p:sp>
+      <p:pic>
+        <p:nvPicPr>
+          <p:cNvPr id="56" name="Graphic 55" descr="Flashlight outline">
+            <a:extLst>
+              <a:ext uri="{FF2B5EF4-FFF2-40B4-BE49-F238E27FC236}">
+                <a16:creationId xmlns:a16="http://schemas.microsoft.com/office/drawing/2014/main" id="{0A6F56D9-D34C-6F32-CAA0-6A8C7AF6E47B}"/>
+              </a:ext>
+            </a:extLst>
+          </p:cNvPr>
+          <p:cNvPicPr>
+            <a:picLocks noChangeAspect="1"/>
+          </p:cNvPicPr>
+          <p:nvPr/>
+        </p:nvPicPr>
+        <p:blipFill>
+          <a:blip r:embed="rId2">
+            <a:extLst>
+              <a:ext uri="{96DAC541-7B7A-43D3-8B79-37D633B846F1}">
+                <asvg:svgBlip xmlns:asvg="http://schemas.microsoft.com/office/drawing/2016/SVG/main" r:embed="rId3"/>
+              </a:ext>
+            </a:extLst>
+          </a:blip>
+          <a:stretch>
+            <a:fillRect/>
+          </a:stretch>
+        </p:blipFill>
+        <p:spPr>
+          <a:xfrm rot="2700000">
+            <a:off x="544626" y="1799365"/>
+            <a:ext cx="677562" cy="657548"/>
+          </a:xfrm>
+          <a:prstGeom prst="rect">
+            <a:avLst/>
+          </a:prstGeom>
+        </p:spPr>
+      </p:pic>
+      <p:pic>
+        <p:nvPicPr>
+          <p:cNvPr id="60" name="Graphic 59" descr="Eye with solid fill">
+            <a:extLst>
+              <a:ext uri="{FF2B5EF4-FFF2-40B4-BE49-F238E27FC236}">
+                <a16:creationId xmlns:a16="http://schemas.microsoft.com/office/drawing/2014/main" id="{DE9E040D-1899-C155-3415-12E1412393C3}"/>
+              </a:ext>
+            </a:extLst>
+          </p:cNvPr>
+          <p:cNvPicPr>
+            <a:picLocks noChangeAspect="1"/>
+          </p:cNvPicPr>
+          <p:nvPr/>
+        </p:nvPicPr>
+        <p:blipFill>
+          <a:blip r:embed="rId4">
+            <a:extLst>
+              <a:ext uri="{96DAC541-7B7A-43D3-8B79-37D633B846F1}">
+                <asvg:svgBlip xmlns:asvg="http://schemas.microsoft.com/office/drawing/2016/SVG/main" r:embed="rId5"/>
+              </a:ext>
+            </a:extLst>
+          </a:blip>
+          <a:stretch>
+            <a:fillRect/>
+          </a:stretch>
+        </p:blipFill>
+        <p:spPr>
+          <a:xfrm>
+            <a:off x="4530115" y="952225"/>
+            <a:ext cx="657548" cy="677562"/>
+          </a:xfrm>
+          <a:prstGeom prst="rect">
+            <a:avLst/>
+          </a:prstGeom>
+        </p:spPr>
+      </p:pic>
+      <p:pic>
+        <p:nvPicPr>
+          <p:cNvPr id="61" name="Graphic 60" descr="Eye with solid fill">
+            <a:extLst>
+              <a:ext uri="{FF2B5EF4-FFF2-40B4-BE49-F238E27FC236}">
+                <a16:creationId xmlns:a16="http://schemas.microsoft.com/office/drawing/2014/main" id="{16237CAE-9E63-206C-BAA2-8A75512A520D}"/>
+              </a:ext>
+            </a:extLst>
+          </p:cNvPr>
+          <p:cNvPicPr>
+            <a:picLocks noChangeAspect="1"/>
+          </p:cNvPicPr>
+          <p:nvPr/>
+        </p:nvPicPr>
+        <p:blipFill>
+          <a:blip r:embed="rId4">
+            <a:extLst>
+              <a:ext uri="{96DAC541-7B7A-43D3-8B79-37D633B846F1}">
+                <asvg:svgBlip xmlns:asvg="http://schemas.microsoft.com/office/drawing/2016/SVG/main" r:embed="rId5"/>
+              </a:ext>
+            </a:extLst>
+          </a:blip>
+          <a:stretch>
+            <a:fillRect/>
+          </a:stretch>
+        </p:blipFill>
+        <p:spPr>
+          <a:xfrm>
+            <a:off x="4517959" y="1705891"/>
+            <a:ext cx="657548" cy="677562"/>
+          </a:xfrm>
+          <a:prstGeom prst="rect">
+            <a:avLst/>
+          </a:prstGeom>
+        </p:spPr>
+      </p:pic>
+      <p:pic>
+        <p:nvPicPr>
+          <p:cNvPr id="62" name="Graphic 61" descr="Eye with solid fill">
+            <a:extLst>
+              <a:ext uri="{FF2B5EF4-FFF2-40B4-BE49-F238E27FC236}">
+                <a16:creationId xmlns:a16="http://schemas.microsoft.com/office/drawing/2014/main" id="{682A65D2-CB51-B673-4FE6-92774DD437DA}"/>
+              </a:ext>
+            </a:extLst>
+          </p:cNvPr>
+          <p:cNvPicPr>
+            <a:picLocks noChangeAspect="1"/>
+          </p:cNvPicPr>
+          <p:nvPr/>
+        </p:nvPicPr>
+        <p:blipFill>
+          <a:blip r:embed="rId4">
+            <a:extLst>
+              <a:ext uri="{96DAC541-7B7A-43D3-8B79-37D633B846F1}">
+                <asvg:svgBlip xmlns:asvg="http://schemas.microsoft.com/office/drawing/2016/SVG/main" r:embed="rId5"/>
+              </a:ext>
+            </a:extLst>
+          </a:blip>
+          <a:stretch>
+            <a:fillRect/>
+          </a:stretch>
+        </p:blipFill>
+        <p:spPr>
+          <a:xfrm>
+            <a:off x="4538332" y="2506200"/>
+            <a:ext cx="657548" cy="677562"/>
+          </a:xfrm>
+          <a:prstGeom prst="rect">
+            <a:avLst/>
+          </a:prstGeom>
+        </p:spPr>
+      </p:pic>
+      <p:sp>
+        <p:nvSpPr>
+          <p:cNvPr id="63" name="TextBox 62">
+            <a:extLst>
+              <a:ext uri="{FF2B5EF4-FFF2-40B4-BE49-F238E27FC236}">
+                <a16:creationId xmlns:a16="http://schemas.microsoft.com/office/drawing/2014/main" id="{BEE44035-6989-59A9-BB98-D79F81C26738}"/>
+              </a:ext>
+            </a:extLst>
+          </p:cNvPr>
+          <p:cNvSpPr txBox="1"/>
+          <p:nvPr/>
+        </p:nvSpPr>
+        <p:spPr>
+          <a:xfrm>
+            <a:off x="2811023" y="1364655"/>
+            <a:ext cx="263077" cy="369332"/>
+          </a:xfrm>
+          <a:prstGeom prst="rect">
+            <a:avLst/>
+          </a:prstGeom>
+          <a:noFill/>
+        </p:spPr>
+        <p:txBody>
+          <a:bodyPr wrap="square" rtlCol="0">
+            <a:spAutoFit/>
+          </a:bodyPr>
+          <a:lstStyle/>
+          <a:p>
+            <a:r>
+              <a:rPr lang="en-US" i="1" dirty="0"/>
+              <a:t>b</a:t>
+            </a:r>
+          </a:p>
+        </p:txBody>
+      </p:sp>
+      <p:sp>
+        <p:nvSpPr>
+          <p:cNvPr id="64" name="TextBox 63">
+            <a:extLst>
+              <a:ext uri="{FF2B5EF4-FFF2-40B4-BE49-F238E27FC236}">
+                <a16:creationId xmlns:a16="http://schemas.microsoft.com/office/drawing/2014/main" id="{F8EE9DC8-45F1-8A43-AB26-932EC6084563}"/>
+              </a:ext>
+            </a:extLst>
+          </p:cNvPr>
+          <p:cNvSpPr txBox="1"/>
+          <p:nvPr/>
+        </p:nvSpPr>
+        <p:spPr>
+          <a:xfrm>
+            <a:off x="2807031" y="2460987"/>
+            <a:ext cx="263077" cy="369332"/>
+          </a:xfrm>
+          <a:prstGeom prst="rect">
+            <a:avLst/>
+          </a:prstGeom>
+          <a:noFill/>
+        </p:spPr>
+        <p:txBody>
+          <a:bodyPr wrap="square" rtlCol="0">
+            <a:spAutoFit/>
+          </a:bodyPr>
+          <a:lstStyle/>
+          <a:p>
+            <a:r>
+              <a:rPr lang="en-US" i="1" dirty="0"/>
+              <a:t>c</a:t>
+            </a:r>
+          </a:p>
+        </p:txBody>
+      </p:sp>
+      <p:sp>
+        <p:nvSpPr>
+          <p:cNvPr id="65" name="TextBox 64">
+            <a:extLst>
+              <a:ext uri="{FF2B5EF4-FFF2-40B4-BE49-F238E27FC236}">
+                <a16:creationId xmlns:a16="http://schemas.microsoft.com/office/drawing/2014/main" id="{5CA96744-42C3-A7AC-B300-B09B3D43CD44}"/>
+              </a:ext>
+            </a:extLst>
+          </p:cNvPr>
+          <p:cNvSpPr txBox="1"/>
+          <p:nvPr/>
+        </p:nvSpPr>
+        <p:spPr>
+          <a:xfrm>
+            <a:off x="5252945" y="1154170"/>
+            <a:ext cx="525671" cy="369332"/>
+          </a:xfrm>
+          <a:prstGeom prst="rect">
+            <a:avLst/>
+          </a:prstGeom>
+          <a:noFill/>
+        </p:spPr>
+        <p:txBody>
+          <a:bodyPr wrap="square" rtlCol="0">
+            <a:spAutoFit/>
+          </a:bodyPr>
+          <a:lstStyle/>
+          <a:p>
+            <a:r>
+              <a:rPr lang="en-US" i="1" dirty="0"/>
+              <a:t>e</a:t>
+            </a:r>
+          </a:p>
+        </p:txBody>
+      </p:sp>
+      <p:sp>
+        <p:nvSpPr>
+          <p:cNvPr id="66" name="TextBox 65">
+            <a:extLst>
+              <a:ext uri="{FF2B5EF4-FFF2-40B4-BE49-F238E27FC236}">
+                <a16:creationId xmlns:a16="http://schemas.microsoft.com/office/drawing/2014/main" id="{2BFCB132-A5BA-24AE-C4F8-FDC5524895D5}"/>
+              </a:ext>
+            </a:extLst>
+          </p:cNvPr>
+          <p:cNvSpPr txBox="1"/>
+          <p:nvPr/>
+        </p:nvSpPr>
+        <p:spPr>
+          <a:xfrm>
+            <a:off x="5275099" y="1942204"/>
+            <a:ext cx="481361" cy="369332"/>
+          </a:xfrm>
+          <a:prstGeom prst="rect">
+            <a:avLst/>
+          </a:prstGeom>
+          <a:noFill/>
+        </p:spPr>
+        <p:txBody>
+          <a:bodyPr wrap="square" rtlCol="0">
+            <a:spAutoFit/>
+          </a:bodyPr>
+          <a:lstStyle/>
+          <a:p>
+            <a:r>
+              <a:rPr lang="en-US" i="1" dirty="0"/>
+              <a:t>f</a:t>
+            </a:r>
+          </a:p>
+        </p:txBody>
+      </p:sp>
+      <p:sp>
+        <p:nvSpPr>
+          <p:cNvPr id="67" name="TextBox 66">
+            <a:extLst>
+              <a:ext uri="{FF2B5EF4-FFF2-40B4-BE49-F238E27FC236}">
+                <a16:creationId xmlns:a16="http://schemas.microsoft.com/office/drawing/2014/main" id="{06E6EDA0-91EB-E4DF-9971-5713D6C2F2CD}"/>
+              </a:ext>
+            </a:extLst>
+          </p:cNvPr>
+          <p:cNvSpPr txBox="1"/>
+          <p:nvPr/>
+        </p:nvSpPr>
+        <p:spPr>
+          <a:xfrm>
+            <a:off x="5275098" y="2730237"/>
+            <a:ext cx="481361" cy="369332"/>
+          </a:xfrm>
+          <a:prstGeom prst="rect">
+            <a:avLst/>
+          </a:prstGeom>
+          <a:noFill/>
+        </p:spPr>
+        <p:txBody>
+          <a:bodyPr wrap="square" rtlCol="0">
+            <a:spAutoFit/>
+          </a:bodyPr>
+          <a:lstStyle/>
+          <a:p>
+            <a:r>
+              <a:rPr lang="en-US" i="1" dirty="0"/>
+              <a:t>g</a:t>
+            </a:r>
+          </a:p>
+        </p:txBody>
+      </p:sp>
+      <p:sp>
+        <p:nvSpPr>
+          <p:cNvPr id="68" name="TextBox 67">
+            <a:extLst>
+              <a:ext uri="{FF2B5EF4-FFF2-40B4-BE49-F238E27FC236}">
+                <a16:creationId xmlns:a16="http://schemas.microsoft.com/office/drawing/2014/main" id="{5EDE4C9F-C7FD-3E21-9FC4-EACA2F3CFD84}"/>
+              </a:ext>
+            </a:extLst>
+          </p:cNvPr>
+          <p:cNvSpPr txBox="1"/>
+          <p:nvPr/>
+        </p:nvSpPr>
+        <p:spPr>
+          <a:xfrm>
+            <a:off x="563830" y="2187698"/>
+            <a:ext cx="263077" cy="273672"/>
+          </a:xfrm>
+          <a:prstGeom prst="rect">
+            <a:avLst/>
+          </a:prstGeom>
+          <a:noFill/>
+        </p:spPr>
+        <p:txBody>
+          <a:bodyPr wrap="square" rtlCol="0">
+            <a:spAutoFit/>
+          </a:bodyPr>
+          <a:lstStyle/>
+          <a:p>
+            <a:r>
+              <a:rPr lang="en-US" i="1" dirty="0"/>
+              <a:t>s</a:t>
+            </a:r>
+          </a:p>
+        </p:txBody>
+      </p:sp>
+      <p:sp>
+        <p:nvSpPr>
+          <p:cNvPr id="6" name="Rectangle 5">
+            <a:extLst>
+              <a:ext uri="{FF2B5EF4-FFF2-40B4-BE49-F238E27FC236}">
+                <a16:creationId xmlns:a16="http://schemas.microsoft.com/office/drawing/2014/main" id="{649686DE-9B88-6812-CAE9-A5C571F836B9}"/>
+              </a:ext>
+            </a:extLst>
+          </p:cNvPr>
+          <p:cNvSpPr/>
+          <p:nvPr/>
+        </p:nvSpPr>
+        <p:spPr>
+          <a:xfrm>
+            <a:off x="7183266" y="1116706"/>
+            <a:ext cx="1029206" cy="392790"/>
+          </a:xfrm>
+          <a:prstGeom prst="rect">
+            <a:avLst/>
+          </a:prstGeom>
+          <a:solidFill>
+            <a:schemeClr val="bg1"/>
+          </a:solidFill>
+          <a:ln>
+            <a:noFill/>
+          </a:ln>
+        </p:spPr>
+        <p:style>
+          <a:lnRef idx="2">
+            <a:schemeClr val="accent1">
+              <a:shade val="15000"/>
+            </a:schemeClr>
+          </a:lnRef>
+          <a:fillRef idx="1">
+            <a:schemeClr val="accent1"/>
+          </a:fillRef>
+          <a:effectRef idx="0">
+            <a:schemeClr val="accent1"/>
+          </a:effectRef>
+          <a:fontRef idx="minor">
+            <a:schemeClr val="lt1"/>
+          </a:fontRef>
+        </p:style>
+        <p:txBody>
+          <a:bodyPr rtlCol="0" anchor="ctr"/>
+          <a:lstStyle/>
+          <a:p>
+            <a:pPr algn="ctr"/>
+            <a:endParaRPr lang="en-US"/>
+          </a:p>
+        </p:txBody>
+      </p:sp>
+      <p:sp>
+        <p:nvSpPr>
+          <p:cNvPr id="7" name="Rectangle 6">
+            <a:extLst>
+              <a:ext uri="{FF2B5EF4-FFF2-40B4-BE49-F238E27FC236}">
+                <a16:creationId xmlns:a16="http://schemas.microsoft.com/office/drawing/2014/main" id="{F851D3B7-D76E-9B75-82DC-10BE6230A282}"/>
+              </a:ext>
+            </a:extLst>
+          </p:cNvPr>
+          <p:cNvSpPr/>
+          <p:nvPr/>
+        </p:nvSpPr>
+        <p:spPr>
+          <a:xfrm>
+            <a:off x="7183265" y="2108500"/>
+            <a:ext cx="1029206" cy="392790"/>
+          </a:xfrm>
+          <a:prstGeom prst="rect">
+            <a:avLst/>
+          </a:prstGeom>
+          <a:solidFill>
+            <a:schemeClr val="bg1"/>
+          </a:solidFill>
+          <a:ln>
+            <a:noFill/>
+          </a:ln>
+        </p:spPr>
+        <p:style>
+          <a:lnRef idx="2">
+            <a:schemeClr val="accent1">
+              <a:shade val="15000"/>
+            </a:schemeClr>
+          </a:lnRef>
+          <a:fillRef idx="1">
+            <a:schemeClr val="accent1"/>
+          </a:fillRef>
+          <a:effectRef idx="0">
+            <a:schemeClr val="accent1"/>
+          </a:effectRef>
+          <a:fontRef idx="minor">
+            <a:schemeClr val="lt1"/>
+          </a:fontRef>
+        </p:style>
+        <p:txBody>
+          <a:bodyPr rtlCol="0" anchor="ctr"/>
+          <a:lstStyle/>
+          <a:p>
+            <a:pPr algn="ctr"/>
+            <a:endParaRPr lang="en-US"/>
+          </a:p>
+        </p:txBody>
+      </p:sp>
+      <p:sp>
+        <p:nvSpPr>
+          <p:cNvPr id="24" name="TextBox 23">
+            <a:extLst>
+              <a:ext uri="{FF2B5EF4-FFF2-40B4-BE49-F238E27FC236}">
+                <a16:creationId xmlns:a16="http://schemas.microsoft.com/office/drawing/2014/main" id="{8E74F926-AEB0-CB45-C34C-2A14A44ED625}"/>
+              </a:ext>
+            </a:extLst>
+          </p:cNvPr>
+          <p:cNvSpPr txBox="1"/>
+          <p:nvPr/>
+        </p:nvSpPr>
+        <p:spPr>
+          <a:xfrm>
+            <a:off x="8618216" y="1225523"/>
+            <a:ext cx="263077" cy="273672"/>
+          </a:xfrm>
+          <a:prstGeom prst="rect">
+            <a:avLst/>
+          </a:prstGeom>
+        </p:spPr>
+        <p:style>
+          <a:lnRef idx="1">
+            <a:schemeClr val="accent1"/>
+          </a:lnRef>
+          <a:fillRef idx="3">
+            <a:schemeClr val="accent1"/>
+          </a:fillRef>
+          <a:effectRef idx="2">
+            <a:schemeClr val="accent1"/>
+          </a:effectRef>
+          <a:fontRef idx="minor">
+            <a:schemeClr val="lt1"/>
+          </a:fontRef>
+        </p:style>
+        <p:txBody>
+          <a:bodyPr wrap="square" rtlCol="0">
+            <a:spAutoFit/>
+          </a:bodyPr>
+          <a:lstStyle/>
+          <a:p>
+            <a:r>
+              <a:rPr lang="en-US" i="1" dirty="0"/>
+              <a:t>a</a:t>
+            </a:r>
+          </a:p>
+        </p:txBody>
+      </p:sp>
+      <p:sp>
+        <p:nvSpPr>
+          <p:cNvPr id="25" name="TextBox 24">
+            <a:extLst>
+              <a:ext uri="{FF2B5EF4-FFF2-40B4-BE49-F238E27FC236}">
+                <a16:creationId xmlns:a16="http://schemas.microsoft.com/office/drawing/2014/main" id="{D4A403C4-E1B6-7B27-49A0-0E470B9A6764}"/>
+              </a:ext>
+            </a:extLst>
+          </p:cNvPr>
+          <p:cNvSpPr txBox="1"/>
+          <p:nvPr/>
+        </p:nvSpPr>
+        <p:spPr>
+          <a:xfrm>
+            <a:off x="8632512" y="2328757"/>
+            <a:ext cx="263077" cy="369332"/>
+          </a:xfrm>
+          <a:prstGeom prst="rect">
+            <a:avLst/>
+          </a:prstGeom>
+        </p:spPr>
+        <p:style>
+          <a:lnRef idx="1">
+            <a:schemeClr val="accent1"/>
+          </a:lnRef>
+          <a:fillRef idx="3">
+            <a:schemeClr val="accent1"/>
+          </a:fillRef>
+          <a:effectRef idx="2">
+            <a:schemeClr val="accent1"/>
+          </a:effectRef>
+          <a:fontRef idx="minor">
+            <a:schemeClr val="lt1"/>
+          </a:fontRef>
+        </p:style>
+        <p:txBody>
+          <a:bodyPr wrap="square" rtlCol="0">
+            <a:spAutoFit/>
+          </a:bodyPr>
+          <a:lstStyle/>
+          <a:p>
+            <a:r>
+              <a:rPr lang="en-US" i="1" dirty="0"/>
+              <a:t>c</a:t>
+            </a:r>
+          </a:p>
+        </p:txBody>
+      </p:sp>
+      <p:sp>
+        <p:nvSpPr>
+          <p:cNvPr id="26" name="TextBox 25">
+            <a:extLst>
+              <a:ext uri="{FF2B5EF4-FFF2-40B4-BE49-F238E27FC236}">
+                <a16:creationId xmlns:a16="http://schemas.microsoft.com/office/drawing/2014/main" id="{63CF1763-F1A9-D83F-4DCE-D1A16BDE7DE9}"/>
+              </a:ext>
+            </a:extLst>
+          </p:cNvPr>
+          <p:cNvSpPr txBox="1"/>
+          <p:nvPr/>
+        </p:nvSpPr>
+        <p:spPr>
+          <a:xfrm>
+            <a:off x="10029190" y="957775"/>
+            <a:ext cx="326607" cy="369332"/>
+          </a:xfrm>
+          <a:prstGeom prst="rect">
+            <a:avLst/>
+          </a:prstGeom>
+        </p:spPr>
+        <p:style>
+          <a:lnRef idx="1">
+            <a:schemeClr val="accent1"/>
+          </a:lnRef>
+          <a:fillRef idx="3">
+            <a:schemeClr val="accent1"/>
+          </a:fillRef>
+          <a:effectRef idx="2">
+            <a:schemeClr val="accent1"/>
+          </a:effectRef>
+          <a:fontRef idx="minor">
+            <a:schemeClr val="lt1"/>
+          </a:fontRef>
+        </p:style>
+        <p:txBody>
+          <a:bodyPr wrap="square" rtlCol="0">
+            <a:spAutoFit/>
+          </a:bodyPr>
+          <a:lstStyle/>
+          <a:p>
+            <a:r>
+              <a:rPr lang="en-US" i="1" dirty="0"/>
+              <a:t>d</a:t>
+            </a:r>
+          </a:p>
+        </p:txBody>
+      </p:sp>
+      <p:sp>
+        <p:nvSpPr>
+          <p:cNvPr id="27" name="TextBox 26">
+            <a:extLst>
+              <a:ext uri="{FF2B5EF4-FFF2-40B4-BE49-F238E27FC236}">
+                <a16:creationId xmlns:a16="http://schemas.microsoft.com/office/drawing/2014/main" id="{555AA57E-229C-67C4-A44C-CF5FE988DE9E}"/>
+              </a:ext>
+            </a:extLst>
+          </p:cNvPr>
+          <p:cNvSpPr txBox="1"/>
+          <p:nvPr/>
+        </p:nvSpPr>
+        <p:spPr>
+          <a:xfrm>
+            <a:off x="10051344" y="1745809"/>
+            <a:ext cx="299077" cy="369332"/>
+          </a:xfrm>
+          <a:prstGeom prst="rect">
+            <a:avLst/>
+          </a:prstGeom>
+        </p:spPr>
+        <p:style>
+          <a:lnRef idx="1">
+            <a:schemeClr val="accent1"/>
+          </a:lnRef>
+          <a:fillRef idx="3">
+            <a:schemeClr val="accent1"/>
+          </a:fillRef>
+          <a:effectRef idx="2">
+            <a:schemeClr val="accent1"/>
+          </a:effectRef>
+          <a:fontRef idx="minor">
+            <a:schemeClr val="lt1"/>
+          </a:fontRef>
+        </p:style>
+        <p:txBody>
+          <a:bodyPr wrap="square" rtlCol="0">
+            <a:spAutoFit/>
+          </a:bodyPr>
+          <a:lstStyle/>
+          <a:p>
+            <a:r>
+              <a:rPr lang="en-US" i="1" dirty="0"/>
+              <a:t>e</a:t>
+            </a:r>
+          </a:p>
+        </p:txBody>
+      </p:sp>
+      <p:sp>
+        <p:nvSpPr>
+          <p:cNvPr id="28" name="TextBox 27">
+            <a:extLst>
+              <a:ext uri="{FF2B5EF4-FFF2-40B4-BE49-F238E27FC236}">
+                <a16:creationId xmlns:a16="http://schemas.microsoft.com/office/drawing/2014/main" id="{28803BFF-D706-FEDF-6A3B-C4D1E4F94AF5}"/>
+              </a:ext>
+            </a:extLst>
+          </p:cNvPr>
+          <p:cNvSpPr txBox="1"/>
+          <p:nvPr/>
+        </p:nvSpPr>
+        <p:spPr>
+          <a:xfrm>
+            <a:off x="10051344" y="2387299"/>
+            <a:ext cx="299077" cy="369332"/>
+          </a:xfrm>
+          <a:prstGeom prst="rect">
+            <a:avLst/>
+          </a:prstGeom>
+        </p:spPr>
+        <p:style>
+          <a:lnRef idx="1">
+            <a:schemeClr val="accent1"/>
+          </a:lnRef>
+          <a:fillRef idx="3">
+            <a:schemeClr val="accent1"/>
+          </a:fillRef>
+          <a:effectRef idx="2">
+            <a:schemeClr val="accent1"/>
+          </a:effectRef>
+          <a:fontRef idx="minor">
+            <a:schemeClr val="lt1"/>
+          </a:fontRef>
+        </p:style>
+        <p:txBody>
+          <a:bodyPr wrap="square" rtlCol="0">
+            <a:spAutoFit/>
+          </a:bodyPr>
+          <a:lstStyle/>
+          <a:p>
+            <a:r>
+              <a:rPr lang="en-US" i="1" dirty="0"/>
+              <a:t>f</a:t>
+            </a:r>
+          </a:p>
+        </p:txBody>
+      </p:sp>
+      <p:sp>
+        <p:nvSpPr>
+          <p:cNvPr id="29" name="TextBox 28">
+            <a:extLst>
+              <a:ext uri="{FF2B5EF4-FFF2-40B4-BE49-F238E27FC236}">
+                <a16:creationId xmlns:a16="http://schemas.microsoft.com/office/drawing/2014/main" id="{C7CABE3E-E462-C660-0A67-7A34E2CACA42}"/>
+              </a:ext>
+            </a:extLst>
+          </p:cNvPr>
+          <p:cNvSpPr txBox="1"/>
+          <p:nvPr/>
+        </p:nvSpPr>
+        <p:spPr>
+          <a:xfrm>
+            <a:off x="7422270" y="1809293"/>
+            <a:ext cx="263077" cy="273672"/>
+          </a:xfrm>
+          <a:prstGeom prst="rect">
+            <a:avLst/>
+          </a:prstGeom>
+        </p:spPr>
+        <p:style>
+          <a:lnRef idx="1">
+            <a:schemeClr val="accent1"/>
+          </a:lnRef>
+          <a:fillRef idx="3">
+            <a:schemeClr val="accent1"/>
+          </a:fillRef>
+          <a:effectRef idx="2">
+            <a:schemeClr val="accent1"/>
+          </a:effectRef>
+          <a:fontRef idx="minor">
+            <a:schemeClr val="lt1"/>
+          </a:fontRef>
+        </p:style>
+        <p:txBody>
+          <a:bodyPr wrap="square" rtlCol="0">
+            <a:spAutoFit/>
+          </a:bodyPr>
+          <a:lstStyle/>
+          <a:p>
+            <a:r>
+              <a:rPr lang="en-US" i="1" dirty="0"/>
+              <a:t>s</a:t>
+            </a:r>
+          </a:p>
+        </p:txBody>
+      </p:sp>
+      <p:cxnSp>
+        <p:nvCxnSpPr>
+          <p:cNvPr id="70" name="Straight Arrow Connector 69">
+            <a:extLst>
+              <a:ext uri="{FF2B5EF4-FFF2-40B4-BE49-F238E27FC236}">
+                <a16:creationId xmlns:a16="http://schemas.microsoft.com/office/drawing/2014/main" id="{735FF4D0-04EA-A88D-118C-FC13BD02CBD3}"/>
+              </a:ext>
+            </a:extLst>
+          </p:cNvPr>
+          <p:cNvCxnSpPr>
+            <a:cxnSpLocks/>
+          </p:cNvCxnSpPr>
+          <p:nvPr/>
+        </p:nvCxnSpPr>
+        <p:spPr>
+          <a:xfrm flipV="1">
+            <a:off x="7752063" y="1474962"/>
+            <a:ext cx="758914" cy="444663"/>
+          </a:xfrm>
+          <a:prstGeom prst="straightConnector1">
+            <a:avLst/>
+          </a:prstGeom>
+          <a:ln>
+            <a:tailEnd type="triangle"/>
+          </a:ln>
+        </p:spPr>
+        <p:style>
+          <a:lnRef idx="3">
+            <a:schemeClr val="accent4"/>
+          </a:lnRef>
+          <a:fillRef idx="0">
+            <a:schemeClr val="accent4"/>
+          </a:fillRef>
+          <a:effectRef idx="2">
+            <a:schemeClr val="accent4"/>
+          </a:effectRef>
+          <a:fontRef idx="minor">
+            <a:schemeClr val="tx1"/>
+          </a:fontRef>
+        </p:style>
+      </p:cxnSp>
+      <p:cxnSp>
+        <p:nvCxnSpPr>
+          <p:cNvPr id="75" name="Straight Arrow Connector 74">
+            <a:extLst>
+              <a:ext uri="{FF2B5EF4-FFF2-40B4-BE49-F238E27FC236}">
+                <a16:creationId xmlns:a16="http://schemas.microsoft.com/office/drawing/2014/main" id="{638E3A6F-790C-AAA2-6736-029FBB0C4FB1}"/>
+              </a:ext>
+            </a:extLst>
+          </p:cNvPr>
+          <p:cNvCxnSpPr>
+            <a:cxnSpLocks/>
+            <a:endCxn id="25" idx="1"/>
+          </p:cNvCxnSpPr>
+          <p:nvPr/>
+        </p:nvCxnSpPr>
+        <p:spPr>
+          <a:xfrm>
+            <a:off x="7740873" y="2056461"/>
+            <a:ext cx="891639" cy="456962"/>
+          </a:xfrm>
+          <a:prstGeom prst="straightConnector1">
+            <a:avLst/>
+          </a:prstGeom>
+          <a:ln>
+            <a:tailEnd type="triangle"/>
+          </a:ln>
+        </p:spPr>
+        <p:style>
+          <a:lnRef idx="3">
+            <a:schemeClr val="accent4"/>
+          </a:lnRef>
+          <a:fillRef idx="0">
+            <a:schemeClr val="accent4"/>
+          </a:fillRef>
+          <a:effectRef idx="2">
+            <a:schemeClr val="accent4"/>
+          </a:effectRef>
+          <a:fontRef idx="minor">
+            <a:schemeClr val="tx1"/>
+          </a:fontRef>
+        </p:style>
+      </p:cxnSp>
+      <p:cxnSp>
+        <p:nvCxnSpPr>
+          <p:cNvPr id="71" name="Straight Arrow Connector 70">
+            <a:extLst>
+              <a:ext uri="{FF2B5EF4-FFF2-40B4-BE49-F238E27FC236}">
+                <a16:creationId xmlns:a16="http://schemas.microsoft.com/office/drawing/2014/main" id="{FA5AFAC7-6357-1F3F-0EC6-C396462D1EBE}"/>
+              </a:ext>
+            </a:extLst>
+          </p:cNvPr>
+          <p:cNvCxnSpPr>
+            <a:cxnSpLocks/>
+          </p:cNvCxnSpPr>
+          <p:nvPr/>
+        </p:nvCxnSpPr>
+        <p:spPr>
+          <a:xfrm flipV="1">
+            <a:off x="9002892" y="1140398"/>
+            <a:ext cx="951509" cy="630640"/>
+          </a:xfrm>
+          <a:prstGeom prst="straightConnector1">
+            <a:avLst/>
+          </a:prstGeom>
+          <a:ln>
+            <a:tailEnd type="triangle"/>
+          </a:ln>
+        </p:spPr>
+        <p:style>
+          <a:lnRef idx="3">
+            <a:schemeClr val="accent4"/>
+          </a:lnRef>
+          <a:fillRef idx="0">
+            <a:schemeClr val="accent4"/>
+          </a:fillRef>
+          <a:effectRef idx="2">
+            <a:schemeClr val="accent4"/>
+          </a:effectRef>
+          <a:fontRef idx="minor">
+            <a:schemeClr val="tx1"/>
+          </a:fontRef>
+        </p:style>
+      </p:cxnSp>
+      <p:cxnSp>
+        <p:nvCxnSpPr>
+          <p:cNvPr id="77" name="Straight Arrow Connector 76">
+            <a:extLst>
+              <a:ext uri="{FF2B5EF4-FFF2-40B4-BE49-F238E27FC236}">
+                <a16:creationId xmlns:a16="http://schemas.microsoft.com/office/drawing/2014/main" id="{D1E7E9AA-77DE-82AE-8055-2E763603015F}"/>
+              </a:ext>
+            </a:extLst>
+          </p:cNvPr>
+          <p:cNvCxnSpPr>
+            <a:cxnSpLocks/>
+          </p:cNvCxnSpPr>
+          <p:nvPr/>
+        </p:nvCxnSpPr>
+        <p:spPr>
+          <a:xfrm>
+            <a:off x="8995081" y="1953696"/>
+            <a:ext cx="1030969" cy="674947"/>
+          </a:xfrm>
+          <a:prstGeom prst="straightConnector1">
+            <a:avLst/>
+          </a:prstGeom>
+          <a:ln>
+            <a:tailEnd type="triangle"/>
+          </a:ln>
+        </p:spPr>
+        <p:style>
+          <a:lnRef idx="3">
+            <a:schemeClr val="accent4"/>
+          </a:lnRef>
+          <a:fillRef idx="0">
+            <a:schemeClr val="accent4"/>
+          </a:fillRef>
+          <a:effectRef idx="2">
+            <a:schemeClr val="accent4"/>
+          </a:effectRef>
+          <a:fontRef idx="minor">
+            <a:schemeClr val="tx1"/>
+          </a:fontRef>
+        </p:style>
+      </p:cxnSp>
+      <p:cxnSp>
+        <p:nvCxnSpPr>
+          <p:cNvPr id="79" name="Straight Arrow Connector 78">
+            <a:extLst>
+              <a:ext uri="{FF2B5EF4-FFF2-40B4-BE49-F238E27FC236}">
+                <a16:creationId xmlns:a16="http://schemas.microsoft.com/office/drawing/2014/main" id="{2D338E16-67F1-18E6-319A-95709A7178BF}"/>
+              </a:ext>
+            </a:extLst>
+          </p:cNvPr>
+          <p:cNvCxnSpPr>
+            <a:cxnSpLocks/>
+          </p:cNvCxnSpPr>
+          <p:nvPr/>
+        </p:nvCxnSpPr>
+        <p:spPr>
+          <a:xfrm flipV="1">
+            <a:off x="9064671" y="1847512"/>
+            <a:ext cx="932625" cy="28079"/>
+          </a:xfrm>
+          <a:prstGeom prst="straightConnector1">
+            <a:avLst/>
+          </a:prstGeom>
+          <a:ln>
+            <a:tailEnd type="triangle"/>
+          </a:ln>
+        </p:spPr>
+        <p:style>
+          <a:lnRef idx="3">
+            <a:schemeClr val="accent4"/>
+          </a:lnRef>
+          <a:fillRef idx="0">
+            <a:schemeClr val="accent4"/>
+          </a:fillRef>
+          <a:effectRef idx="2">
+            <a:schemeClr val="accent4"/>
+          </a:effectRef>
+          <a:fontRef idx="minor">
+            <a:schemeClr val="tx1"/>
+          </a:fontRef>
+        </p:style>
+      </p:cxnSp>
       <p:grpSp>
         <p:nvGrpSpPr>
-          <p:cNvPr id="51" name="Group 50">
-            <a:extLst>
-              <a:ext uri="{FF2B5EF4-FFF2-40B4-BE49-F238E27FC236}">
-                <a16:creationId xmlns:a16="http://schemas.microsoft.com/office/drawing/2014/main" id="{0CA43D4A-0750-BC70-53AD-2EBD155470C2}"/>
+          <p:cNvPr id="82" name="Group 81">
+            <a:extLst>
+              <a:ext uri="{FF2B5EF4-FFF2-40B4-BE49-F238E27FC236}">
+                <a16:creationId xmlns:a16="http://schemas.microsoft.com/office/drawing/2014/main" id="{4C025BC0-2811-3273-CD49-75B0C8702EA2}"/>
               </a:ext>
             </a:extLst>
           </p:cNvPr>
@@ -3782,1105 +4942,19 @@
           <p:nvPr/>
         </p:nvGrpSpPr>
         <p:grpSpPr>
-          <a:xfrm>
-            <a:off x="554633" y="586441"/>
-            <a:ext cx="5223983" cy="3269973"/>
-            <a:chOff x="352605" y="569844"/>
-            <a:chExt cx="7264578" cy="4412973"/>
+          <a:xfrm flipV="1">
+            <a:off x="8938405" y="1293460"/>
+            <a:ext cx="1057419" cy="1332008"/>
+            <a:chOff x="10092565" y="1298663"/>
+            <a:chExt cx="1072293" cy="1408480"/>
           </a:xfrm>
         </p:grpSpPr>
-        <p:sp>
-          <p:nvSpPr>
-            <p:cNvPr id="52" name="Rectangle 51">
+        <p:cxnSp>
+          <p:nvCxnSpPr>
+            <p:cNvPr id="83" name="Straight Arrow Connector 82">
               <a:extLst>
                 <a:ext uri="{FF2B5EF4-FFF2-40B4-BE49-F238E27FC236}">
-                  <a16:creationId xmlns:a16="http://schemas.microsoft.com/office/drawing/2014/main" id="{9BE6C25C-C16E-45C6-A8E8-BA6195A5A518}"/>
-                </a:ext>
-              </a:extLst>
-            </p:cNvPr>
-            <p:cNvSpPr/>
-            <p:nvPr/>
-          </p:nvSpPr>
-          <p:spPr>
-            <a:xfrm>
-              <a:off x="3418905" y="728869"/>
-              <a:ext cx="450574" cy="3710609"/>
-            </a:xfrm>
-            <a:prstGeom prst="rect">
-              <a:avLst/>
-            </a:prstGeom>
-            <a:solidFill>
-              <a:schemeClr val="tx1">
-                <a:lumMod val="50000"/>
-                <a:lumOff val="50000"/>
-              </a:schemeClr>
-            </a:solidFill>
-          </p:spPr>
-          <p:style>
-            <a:lnRef idx="2">
-              <a:schemeClr val="accent3">
-                <a:shade val="15000"/>
-              </a:schemeClr>
-            </a:lnRef>
-            <a:fillRef idx="1">
-              <a:schemeClr val="accent3"/>
-            </a:fillRef>
-            <a:effectRef idx="0">
-              <a:schemeClr val="accent3"/>
-            </a:effectRef>
-            <a:fontRef idx="minor">
-              <a:schemeClr val="lt1"/>
-            </a:fontRef>
-          </p:style>
-          <p:txBody>
-            <a:bodyPr rtlCol="0" anchor="ctr"/>
-            <a:lstStyle/>
-            <a:p>
-              <a:pPr algn="ctr"/>
-              <a:endParaRPr lang="en-US"/>
-            </a:p>
-          </p:txBody>
-        </p:sp>
-        <p:sp>
-          <p:nvSpPr>
-            <p:cNvPr id="53" name="Rectangle 52">
-              <a:extLst>
-                <a:ext uri="{FF2B5EF4-FFF2-40B4-BE49-F238E27FC236}">
-                  <a16:creationId xmlns:a16="http://schemas.microsoft.com/office/drawing/2014/main" id="{6B192779-C53B-9F4C-47CF-17221D6199E8}"/>
-                </a:ext>
-              </a:extLst>
-            </p:cNvPr>
-            <p:cNvSpPr/>
-            <p:nvPr/>
-          </p:nvSpPr>
-          <p:spPr>
-            <a:xfrm>
-              <a:off x="6095999" y="728869"/>
-              <a:ext cx="450574" cy="3710609"/>
-            </a:xfrm>
-            <a:prstGeom prst="rect">
-              <a:avLst/>
-            </a:prstGeom>
-            <a:solidFill>
-              <a:schemeClr val="tx1">
-                <a:lumMod val="50000"/>
-                <a:lumOff val="50000"/>
-              </a:schemeClr>
-            </a:solidFill>
-          </p:spPr>
-          <p:style>
-            <a:lnRef idx="2">
-              <a:schemeClr val="accent3">
-                <a:shade val="15000"/>
-              </a:schemeClr>
-            </a:lnRef>
-            <a:fillRef idx="1">
-              <a:schemeClr val="accent3"/>
-            </a:fillRef>
-            <a:effectRef idx="0">
-              <a:schemeClr val="accent3"/>
-            </a:effectRef>
-            <a:fontRef idx="minor">
-              <a:schemeClr val="lt1"/>
-            </a:fontRef>
-          </p:style>
-          <p:txBody>
-            <a:bodyPr rtlCol="0" anchor="ctr"/>
-            <a:lstStyle/>
-            <a:p>
-              <a:pPr algn="ctr"/>
-              <a:endParaRPr lang="en-US"/>
-            </a:p>
-          </p:txBody>
-        </p:sp>
-        <p:sp>
-          <p:nvSpPr>
-            <p:cNvPr id="54" name="Rectangle 53">
-              <a:extLst>
-                <a:ext uri="{FF2B5EF4-FFF2-40B4-BE49-F238E27FC236}">
-                  <a16:creationId xmlns:a16="http://schemas.microsoft.com/office/drawing/2014/main" id="{F3C65449-2460-9B9D-29E2-49A9C916D5FC}"/>
-                </a:ext>
-              </a:extLst>
-            </p:cNvPr>
-            <p:cNvSpPr/>
-            <p:nvPr/>
-          </p:nvSpPr>
-          <p:spPr>
-            <a:xfrm>
-              <a:off x="2928574" y="1666543"/>
-              <a:ext cx="1429187" cy="414047"/>
-            </a:xfrm>
-            <a:prstGeom prst="rect">
-              <a:avLst/>
-            </a:prstGeom>
-            <a:solidFill>
-              <a:schemeClr val="bg1"/>
-            </a:solidFill>
-            <a:ln>
-              <a:noFill/>
-            </a:ln>
-          </p:spPr>
-          <p:style>
-            <a:lnRef idx="2">
-              <a:schemeClr val="accent1">
-                <a:shade val="15000"/>
-              </a:schemeClr>
-            </a:lnRef>
-            <a:fillRef idx="1">
-              <a:schemeClr val="accent1"/>
-            </a:fillRef>
-            <a:effectRef idx="0">
-              <a:schemeClr val="accent1"/>
-            </a:effectRef>
-            <a:fontRef idx="minor">
-              <a:schemeClr val="lt1"/>
-            </a:fontRef>
-          </p:style>
-          <p:txBody>
-            <a:bodyPr rtlCol="0" anchor="ctr"/>
-            <a:lstStyle/>
-            <a:p>
-              <a:pPr algn="ctr"/>
-              <a:endParaRPr lang="en-US"/>
-            </a:p>
-          </p:txBody>
-        </p:sp>
-        <p:sp>
-          <p:nvSpPr>
-            <p:cNvPr id="55" name="Rectangle 54">
-              <a:extLst>
-                <a:ext uri="{FF2B5EF4-FFF2-40B4-BE49-F238E27FC236}">
-                  <a16:creationId xmlns:a16="http://schemas.microsoft.com/office/drawing/2014/main" id="{7AEEA9C3-0E04-77EF-CE9E-C01FF116BD6C}"/>
-                </a:ext>
-              </a:extLst>
-            </p:cNvPr>
-            <p:cNvSpPr/>
-            <p:nvPr/>
-          </p:nvSpPr>
-          <p:spPr>
-            <a:xfrm>
-              <a:off x="2928572" y="3018264"/>
-              <a:ext cx="1292740" cy="531334"/>
-            </a:xfrm>
-            <a:prstGeom prst="rect">
-              <a:avLst/>
-            </a:prstGeom>
-            <a:solidFill>
-              <a:schemeClr val="bg1"/>
-            </a:solidFill>
-            <a:ln>
-              <a:noFill/>
-            </a:ln>
-          </p:spPr>
-          <p:style>
-            <a:lnRef idx="2">
-              <a:schemeClr val="accent1">
-                <a:shade val="15000"/>
-              </a:schemeClr>
-            </a:lnRef>
-            <a:fillRef idx="1">
-              <a:schemeClr val="accent1"/>
-            </a:fillRef>
-            <a:effectRef idx="0">
-              <a:schemeClr val="accent1"/>
-            </a:effectRef>
-            <a:fontRef idx="minor">
-              <a:schemeClr val="lt1"/>
-            </a:fontRef>
-          </p:style>
-          <p:txBody>
-            <a:bodyPr rtlCol="0" anchor="ctr"/>
-            <a:lstStyle/>
-            <a:p>
-              <a:pPr algn="ctr"/>
-              <a:endParaRPr lang="en-US"/>
-            </a:p>
-          </p:txBody>
-        </p:sp>
-        <p:pic>
-          <p:nvPicPr>
-            <p:cNvPr id="56" name="Graphic 55" descr="Flashlight outline">
-              <a:extLst>
-                <a:ext uri="{FF2B5EF4-FFF2-40B4-BE49-F238E27FC236}">
-                  <a16:creationId xmlns:a16="http://schemas.microsoft.com/office/drawing/2014/main" id="{0A6F56D9-D34C-6F32-CAA0-6A8C7AF6E47B}"/>
-                </a:ext>
-              </a:extLst>
-            </p:cNvPr>
-            <p:cNvPicPr>
-              <a:picLocks noChangeAspect="1"/>
-            </p:cNvPicPr>
-            <p:nvPr/>
-          </p:nvPicPr>
-          <p:blipFill>
-            <a:blip r:embed="rId2">
-              <a:extLst>
-                <a:ext uri="{96DAC541-7B7A-43D3-8B79-37D633B846F1}">
-                  <asvg:svgBlip xmlns:asvg="http://schemas.microsoft.com/office/drawing/2016/SVG/main" r:embed="rId3"/>
-                </a:ext>
-              </a:extLst>
-            </a:blip>
-            <a:stretch>
-              <a:fillRect/>
-            </a:stretch>
-          </p:blipFill>
-          <p:spPr>
-            <a:xfrm rot="2700000">
-              <a:off x="352605" y="2193234"/>
-              <a:ext cx="914400" cy="914400"/>
-            </a:xfrm>
-            <a:prstGeom prst="rect">
-              <a:avLst/>
-            </a:prstGeom>
-          </p:spPr>
-        </p:pic>
-        <p:pic>
-          <p:nvPicPr>
-            <p:cNvPr id="57" name="Graphic 56" descr="Normal Distribution outline">
-              <a:extLst>
-                <a:ext uri="{FF2B5EF4-FFF2-40B4-BE49-F238E27FC236}">
-                  <a16:creationId xmlns:a16="http://schemas.microsoft.com/office/drawing/2014/main" id="{1F47ECB8-DF0C-EB43-E044-3A24B2923A54}"/>
-                </a:ext>
-              </a:extLst>
-            </p:cNvPr>
-            <p:cNvPicPr>
-              <a:picLocks noChangeAspect="1"/>
-            </p:cNvPicPr>
-            <p:nvPr/>
-          </p:nvPicPr>
-          <p:blipFill>
-            <a:blip r:embed="rId4">
-              <a:extLst>
-                <a:ext uri="{96DAC541-7B7A-43D3-8B79-37D633B846F1}">
-                  <asvg:svgBlip xmlns:asvg="http://schemas.microsoft.com/office/drawing/2016/SVG/main" r:embed="rId5"/>
-                </a:ext>
-              </a:extLst>
-            </a:blip>
-            <a:srcRect r="18910"/>
-            <a:stretch>
-              <a:fillRect/>
-            </a:stretch>
-          </p:blipFill>
-          <p:spPr>
-            <a:xfrm rot="16200000">
-              <a:off x="3674087" y="1255565"/>
-              <a:ext cx="3107634" cy="1736192"/>
-            </a:xfrm>
-            <a:prstGeom prst="rect">
-              <a:avLst/>
-            </a:prstGeom>
-          </p:spPr>
-        </p:pic>
-        <p:pic>
-          <p:nvPicPr>
-            <p:cNvPr id="58" name="Graphic 57" descr="Normal Distribution outline">
-              <a:extLst>
-                <a:ext uri="{FF2B5EF4-FFF2-40B4-BE49-F238E27FC236}">
-                  <a16:creationId xmlns:a16="http://schemas.microsoft.com/office/drawing/2014/main" id="{B7CCBE32-D187-AEE6-05CF-BD754BBAB94C}"/>
-                </a:ext>
-              </a:extLst>
-            </p:cNvPr>
-            <p:cNvPicPr>
-              <a:picLocks noChangeAspect="1"/>
-            </p:cNvPicPr>
-            <p:nvPr/>
-          </p:nvPicPr>
-          <p:blipFill>
-            <a:blip r:embed="rId4">
-              <a:extLst>
-                <a:ext uri="{96DAC541-7B7A-43D3-8B79-37D633B846F1}">
-                  <asvg:svgBlip xmlns:asvg="http://schemas.microsoft.com/office/drawing/2016/SVG/main" r:embed="rId5"/>
-                </a:ext>
-              </a:extLst>
-            </a:blip>
-            <a:srcRect r="18910"/>
-            <a:stretch>
-              <a:fillRect/>
-            </a:stretch>
-          </p:blipFill>
-          <p:spPr>
-            <a:xfrm rot="16200000">
-              <a:off x="958324" y="1939140"/>
-              <a:ext cx="3352800" cy="1873163"/>
-            </a:xfrm>
-            <a:prstGeom prst="rect">
-              <a:avLst/>
-            </a:prstGeom>
-          </p:spPr>
-        </p:pic>
-        <p:pic>
-          <p:nvPicPr>
-            <p:cNvPr id="59" name="Graphic 58" descr="Normal Distribution outline">
-              <a:extLst>
-                <a:ext uri="{FF2B5EF4-FFF2-40B4-BE49-F238E27FC236}">
-                  <a16:creationId xmlns:a16="http://schemas.microsoft.com/office/drawing/2014/main" id="{90D9142C-3E05-9DD8-6A17-159A8D76C3BC}"/>
-                </a:ext>
-              </a:extLst>
-            </p:cNvPr>
-            <p:cNvPicPr>
-              <a:picLocks noChangeAspect="1"/>
-            </p:cNvPicPr>
-            <p:nvPr/>
-          </p:nvPicPr>
-          <p:blipFill>
-            <a:blip r:embed="rId4">
-              <a:extLst>
-                <a:ext uri="{96DAC541-7B7A-43D3-8B79-37D633B846F1}">
-                  <asvg:svgBlip xmlns:asvg="http://schemas.microsoft.com/office/drawing/2016/SVG/main" r:embed="rId5"/>
-                </a:ext>
-              </a:extLst>
-            </a:blip>
-            <a:srcRect r="18910"/>
-            <a:stretch>
-              <a:fillRect/>
-            </a:stretch>
-          </p:blipFill>
-          <p:spPr>
-            <a:xfrm rot="16200000">
-              <a:off x="3674087" y="2560904"/>
-              <a:ext cx="3107634" cy="1736192"/>
-            </a:xfrm>
-            <a:prstGeom prst="rect">
-              <a:avLst/>
-            </a:prstGeom>
-          </p:spPr>
-        </p:pic>
-        <p:pic>
-          <p:nvPicPr>
-            <p:cNvPr id="60" name="Graphic 59" descr="Eye with solid fill">
-              <a:extLst>
-                <a:ext uri="{FF2B5EF4-FFF2-40B4-BE49-F238E27FC236}">
-                  <a16:creationId xmlns:a16="http://schemas.microsoft.com/office/drawing/2014/main" id="{DE9E040D-1899-C155-3415-12E1412393C3}"/>
-                </a:ext>
-              </a:extLst>
-            </p:cNvPr>
-            <p:cNvPicPr>
-              <a:picLocks noChangeAspect="1"/>
-            </p:cNvPicPr>
-            <p:nvPr/>
-          </p:nvPicPr>
-          <p:blipFill>
-            <a:blip r:embed="rId6">
-              <a:extLst>
-                <a:ext uri="{96DAC541-7B7A-43D3-8B79-37D633B846F1}">
-                  <asvg:svgBlip xmlns:asvg="http://schemas.microsoft.com/office/drawing/2016/SVG/main" r:embed="rId7"/>
-                </a:ext>
-              </a:extLst>
-            </a:blip>
-            <a:stretch>
-              <a:fillRect/>
-            </a:stretch>
-          </p:blipFill>
-          <p:spPr>
-            <a:xfrm>
-              <a:off x="5880992" y="1063486"/>
-              <a:ext cx="914400" cy="914400"/>
-            </a:xfrm>
-            <a:prstGeom prst="rect">
-              <a:avLst/>
-            </a:prstGeom>
-          </p:spPr>
-        </p:pic>
-        <p:pic>
-          <p:nvPicPr>
-            <p:cNvPr id="61" name="Graphic 60" descr="Eye with solid fill">
-              <a:extLst>
-                <a:ext uri="{FF2B5EF4-FFF2-40B4-BE49-F238E27FC236}">
-                  <a16:creationId xmlns:a16="http://schemas.microsoft.com/office/drawing/2014/main" id="{16237CAE-9E63-206C-BAA2-8A75512A520D}"/>
-                </a:ext>
-              </a:extLst>
-            </p:cNvPr>
-            <p:cNvPicPr>
-              <a:picLocks noChangeAspect="1"/>
-            </p:cNvPicPr>
-            <p:nvPr/>
-          </p:nvPicPr>
-          <p:blipFill>
-            <a:blip r:embed="rId6">
-              <a:extLst>
-                <a:ext uri="{96DAC541-7B7A-43D3-8B79-37D633B846F1}">
-                  <asvg:svgBlip xmlns:asvg="http://schemas.microsoft.com/office/drawing/2016/SVG/main" r:embed="rId7"/>
-                </a:ext>
-              </a:extLst>
-            </a:blip>
-            <a:stretch>
-              <a:fillRect/>
-            </a:stretch>
-          </p:blipFill>
-          <p:spPr>
-            <a:xfrm>
-              <a:off x="5864087" y="2080591"/>
-              <a:ext cx="914400" cy="914400"/>
-            </a:xfrm>
-            <a:prstGeom prst="rect">
-              <a:avLst/>
-            </a:prstGeom>
-          </p:spPr>
-        </p:pic>
-        <p:pic>
-          <p:nvPicPr>
-            <p:cNvPr id="62" name="Graphic 61" descr="Eye with solid fill">
-              <a:extLst>
-                <a:ext uri="{FF2B5EF4-FFF2-40B4-BE49-F238E27FC236}">
-                  <a16:creationId xmlns:a16="http://schemas.microsoft.com/office/drawing/2014/main" id="{682A65D2-CB51-B673-4FE6-92774DD437DA}"/>
-                </a:ext>
-              </a:extLst>
-            </p:cNvPr>
-            <p:cNvPicPr>
-              <a:picLocks noChangeAspect="1"/>
-            </p:cNvPicPr>
-            <p:nvPr/>
-          </p:nvPicPr>
-          <p:blipFill>
-            <a:blip r:embed="rId6">
-              <a:extLst>
-                <a:ext uri="{96DAC541-7B7A-43D3-8B79-37D633B846F1}">
-                  <asvg:svgBlip xmlns:asvg="http://schemas.microsoft.com/office/drawing/2016/SVG/main" r:embed="rId7"/>
-                </a:ext>
-              </a:extLst>
-            </a:blip>
-            <a:stretch>
-              <a:fillRect/>
-            </a:stretch>
-          </p:blipFill>
-          <p:spPr>
-            <a:xfrm>
-              <a:off x="5892418" y="3160643"/>
-              <a:ext cx="914400" cy="914400"/>
-            </a:xfrm>
-            <a:prstGeom prst="rect">
-              <a:avLst/>
-            </a:prstGeom>
-          </p:spPr>
-        </p:pic>
-        <p:sp>
-          <p:nvSpPr>
-            <p:cNvPr id="63" name="TextBox 62">
-              <a:extLst>
-                <a:ext uri="{FF2B5EF4-FFF2-40B4-BE49-F238E27FC236}">
-                  <a16:creationId xmlns:a16="http://schemas.microsoft.com/office/drawing/2014/main" id="{BEE44035-6989-59A9-BB98-D79F81C26738}"/>
-                </a:ext>
-              </a:extLst>
-            </p:cNvPr>
-            <p:cNvSpPr txBox="1"/>
-            <p:nvPr/>
-          </p:nvSpPr>
-          <p:spPr>
-            <a:xfrm>
-              <a:off x="3490387" y="1620078"/>
-              <a:ext cx="365840" cy="369332"/>
-            </a:xfrm>
-            <a:prstGeom prst="rect">
-              <a:avLst/>
-            </a:prstGeom>
-            <a:noFill/>
-          </p:spPr>
-          <p:txBody>
-            <a:bodyPr wrap="square" rtlCol="0">
-              <a:spAutoFit/>
-            </a:bodyPr>
-            <a:lstStyle/>
-            <a:p>
-              <a:r>
-                <a:rPr lang="en-US" i="1" dirty="0"/>
-                <a:t>a</a:t>
-              </a:r>
-            </a:p>
-          </p:txBody>
-        </p:sp>
-        <p:sp>
-          <p:nvSpPr>
-            <p:cNvPr id="64" name="TextBox 63">
-              <a:extLst>
-                <a:ext uri="{FF2B5EF4-FFF2-40B4-BE49-F238E27FC236}">
-                  <a16:creationId xmlns:a16="http://schemas.microsoft.com/office/drawing/2014/main" id="{F8EE9DC8-45F1-8A43-AB26-932EC6084563}"/>
-                </a:ext>
-              </a:extLst>
-            </p:cNvPr>
-            <p:cNvSpPr txBox="1"/>
-            <p:nvPr/>
-          </p:nvSpPr>
-          <p:spPr>
-            <a:xfrm>
-              <a:off x="3510268" y="3099627"/>
-              <a:ext cx="365840" cy="369332"/>
-            </a:xfrm>
-            <a:prstGeom prst="rect">
-              <a:avLst/>
-            </a:prstGeom>
-            <a:noFill/>
-          </p:spPr>
-          <p:txBody>
-            <a:bodyPr wrap="square" rtlCol="0">
-              <a:spAutoFit/>
-            </a:bodyPr>
-            <a:lstStyle/>
-            <a:p>
-              <a:r>
-                <a:rPr lang="en-US" i="1" dirty="0"/>
-                <a:t>b</a:t>
-              </a:r>
-            </a:p>
-          </p:txBody>
-        </p:sp>
-        <p:sp>
-          <p:nvSpPr>
-            <p:cNvPr id="65" name="TextBox 64">
-              <a:extLst>
-                <a:ext uri="{FF2B5EF4-FFF2-40B4-BE49-F238E27FC236}">
-                  <a16:creationId xmlns:a16="http://schemas.microsoft.com/office/drawing/2014/main" id="{5CA96744-42C3-A7AC-B300-B09B3D43CD44}"/>
-                </a:ext>
-              </a:extLst>
-            </p:cNvPr>
-            <p:cNvSpPr txBox="1"/>
-            <p:nvPr/>
-          </p:nvSpPr>
-          <p:spPr>
-            <a:xfrm>
-              <a:off x="6886174" y="1336020"/>
-              <a:ext cx="731009" cy="369332"/>
-            </a:xfrm>
-            <a:prstGeom prst="rect">
-              <a:avLst/>
-            </a:prstGeom>
-            <a:noFill/>
-          </p:spPr>
-          <p:txBody>
-            <a:bodyPr wrap="square" rtlCol="0">
-              <a:spAutoFit/>
-            </a:bodyPr>
-            <a:lstStyle/>
-            <a:p>
-              <a:r>
-                <a:rPr lang="en-US" i="1" dirty="0"/>
-                <a:t>c</a:t>
-              </a:r>
-            </a:p>
-          </p:txBody>
-        </p:sp>
-        <p:sp>
-          <p:nvSpPr>
-            <p:cNvPr id="66" name="TextBox 65">
-              <a:extLst>
-                <a:ext uri="{FF2B5EF4-FFF2-40B4-BE49-F238E27FC236}">
-                  <a16:creationId xmlns:a16="http://schemas.microsoft.com/office/drawing/2014/main" id="{2BFCB132-A5BA-24AE-C4F8-FDC5524895D5}"/>
-                </a:ext>
-              </a:extLst>
-            </p:cNvPr>
-            <p:cNvSpPr txBox="1"/>
-            <p:nvPr/>
-          </p:nvSpPr>
-          <p:spPr>
-            <a:xfrm>
-              <a:off x="6916982" y="2399506"/>
-              <a:ext cx="669391" cy="369332"/>
-            </a:xfrm>
-            <a:prstGeom prst="rect">
-              <a:avLst/>
-            </a:prstGeom>
-            <a:noFill/>
-          </p:spPr>
-          <p:txBody>
-            <a:bodyPr wrap="square" rtlCol="0">
-              <a:spAutoFit/>
-            </a:bodyPr>
-            <a:lstStyle/>
-            <a:p>
-              <a:r>
-                <a:rPr lang="en-US" i="1" dirty="0"/>
-                <a:t>d</a:t>
-              </a:r>
-            </a:p>
-          </p:txBody>
-        </p:sp>
-        <p:sp>
-          <p:nvSpPr>
-            <p:cNvPr id="67" name="TextBox 66">
-              <a:extLst>
-                <a:ext uri="{FF2B5EF4-FFF2-40B4-BE49-F238E27FC236}">
-                  <a16:creationId xmlns:a16="http://schemas.microsoft.com/office/drawing/2014/main" id="{06E6EDA0-91EB-E4DF-9971-5713D6C2F2CD}"/>
-                </a:ext>
-              </a:extLst>
-            </p:cNvPr>
-            <p:cNvSpPr txBox="1"/>
-            <p:nvPr/>
-          </p:nvSpPr>
-          <p:spPr>
-            <a:xfrm>
-              <a:off x="6916981" y="3462992"/>
-              <a:ext cx="669391" cy="369332"/>
-            </a:xfrm>
-            <a:prstGeom prst="rect">
-              <a:avLst/>
-            </a:prstGeom>
-            <a:noFill/>
-          </p:spPr>
-          <p:txBody>
-            <a:bodyPr wrap="square" rtlCol="0">
-              <a:spAutoFit/>
-            </a:bodyPr>
-            <a:lstStyle/>
-            <a:p>
-              <a:r>
-                <a:rPr lang="en-US" i="1" dirty="0"/>
-                <a:t>e</a:t>
-              </a:r>
-            </a:p>
-          </p:txBody>
-        </p:sp>
-        <p:sp>
-          <p:nvSpPr>
-            <p:cNvPr id="68" name="TextBox 67">
-              <a:extLst>
-                <a:ext uri="{FF2B5EF4-FFF2-40B4-BE49-F238E27FC236}">
-                  <a16:creationId xmlns:a16="http://schemas.microsoft.com/office/drawing/2014/main" id="{5EDE4C9F-C7FD-3E21-9FC4-EACA2F3CFD84}"/>
-                </a:ext>
-              </a:extLst>
-            </p:cNvPr>
-            <p:cNvSpPr txBox="1"/>
-            <p:nvPr/>
-          </p:nvSpPr>
-          <p:spPr>
-            <a:xfrm>
-              <a:off x="365395" y="2730811"/>
-              <a:ext cx="365840" cy="369332"/>
-            </a:xfrm>
-            <a:prstGeom prst="rect">
-              <a:avLst/>
-            </a:prstGeom>
-            <a:noFill/>
-          </p:spPr>
-          <p:txBody>
-            <a:bodyPr wrap="square" rtlCol="0">
-              <a:spAutoFit/>
-            </a:bodyPr>
-            <a:lstStyle/>
-            <a:p>
-              <a:r>
-                <a:rPr lang="en-US" i="1" dirty="0"/>
-                <a:t>s</a:t>
-              </a:r>
-            </a:p>
-          </p:txBody>
-        </p:sp>
-      </p:grpSp>
-      <p:grpSp>
-        <p:nvGrpSpPr>
-          <p:cNvPr id="86" name="Group 85">
-            <a:extLst>
-              <a:ext uri="{FF2B5EF4-FFF2-40B4-BE49-F238E27FC236}">
-                <a16:creationId xmlns:a16="http://schemas.microsoft.com/office/drawing/2014/main" id="{CEA8F296-BA2C-2828-2C4D-89B08AD30A8F}"/>
-              </a:ext>
-            </a:extLst>
-          </p:cNvPr>
-          <p:cNvGrpSpPr/>
-          <p:nvPr/>
-        </p:nvGrpSpPr>
-        <p:grpSpPr>
-          <a:xfrm>
-            <a:off x="7183265" y="957775"/>
-            <a:ext cx="3172532" cy="1945399"/>
-            <a:chOff x="7183265" y="957775"/>
-            <a:chExt cx="3172532" cy="1945399"/>
-          </a:xfrm>
-        </p:grpSpPr>
-        <p:sp>
-          <p:nvSpPr>
-            <p:cNvPr id="6" name="Rectangle 5">
-              <a:extLst>
-                <a:ext uri="{FF2B5EF4-FFF2-40B4-BE49-F238E27FC236}">
-                  <a16:creationId xmlns:a16="http://schemas.microsoft.com/office/drawing/2014/main" id="{649686DE-9B88-6812-CAE9-A5C571F836B9}"/>
-                </a:ext>
-              </a:extLst>
-            </p:cNvPr>
-            <p:cNvSpPr/>
-            <p:nvPr/>
-          </p:nvSpPr>
-          <p:spPr>
-            <a:xfrm>
-              <a:off x="7183266" y="1116706"/>
-              <a:ext cx="1029206" cy="392790"/>
-            </a:xfrm>
-            <a:prstGeom prst="rect">
-              <a:avLst/>
-            </a:prstGeom>
-            <a:solidFill>
-              <a:schemeClr val="bg1"/>
-            </a:solidFill>
-            <a:ln>
-              <a:noFill/>
-            </a:ln>
-          </p:spPr>
-          <p:style>
-            <a:lnRef idx="2">
-              <a:schemeClr val="accent1">
-                <a:shade val="15000"/>
-              </a:schemeClr>
-            </a:lnRef>
-            <a:fillRef idx="1">
-              <a:schemeClr val="accent1"/>
-            </a:fillRef>
-            <a:effectRef idx="0">
-              <a:schemeClr val="accent1"/>
-            </a:effectRef>
-            <a:fontRef idx="minor">
-              <a:schemeClr val="lt1"/>
-            </a:fontRef>
-          </p:style>
-          <p:txBody>
-            <a:bodyPr rtlCol="0" anchor="ctr"/>
-            <a:lstStyle/>
-            <a:p>
-              <a:pPr algn="ctr"/>
-              <a:endParaRPr lang="en-US"/>
-            </a:p>
-          </p:txBody>
-        </p:sp>
-        <p:sp>
-          <p:nvSpPr>
-            <p:cNvPr id="7" name="Rectangle 6">
-              <a:extLst>
-                <a:ext uri="{FF2B5EF4-FFF2-40B4-BE49-F238E27FC236}">
-                  <a16:creationId xmlns:a16="http://schemas.microsoft.com/office/drawing/2014/main" id="{F851D3B7-D76E-9B75-82DC-10BE6230A282}"/>
-                </a:ext>
-              </a:extLst>
-            </p:cNvPr>
-            <p:cNvSpPr/>
-            <p:nvPr/>
-          </p:nvSpPr>
-          <p:spPr>
-            <a:xfrm>
-              <a:off x="7183265" y="2108500"/>
-              <a:ext cx="1029206" cy="392790"/>
-            </a:xfrm>
-            <a:prstGeom prst="rect">
-              <a:avLst/>
-            </a:prstGeom>
-            <a:solidFill>
-              <a:schemeClr val="bg1"/>
-            </a:solidFill>
-            <a:ln>
-              <a:noFill/>
-            </a:ln>
-          </p:spPr>
-          <p:style>
-            <a:lnRef idx="2">
-              <a:schemeClr val="accent1">
-                <a:shade val="15000"/>
-              </a:schemeClr>
-            </a:lnRef>
-            <a:fillRef idx="1">
-              <a:schemeClr val="accent1"/>
-            </a:fillRef>
-            <a:effectRef idx="0">
-              <a:schemeClr val="accent1"/>
-            </a:effectRef>
-            <a:fontRef idx="minor">
-              <a:schemeClr val="lt1"/>
-            </a:fontRef>
-          </p:style>
-          <p:txBody>
-            <a:bodyPr rtlCol="0" anchor="ctr"/>
-            <a:lstStyle/>
-            <a:p>
-              <a:pPr algn="ctr"/>
-              <a:endParaRPr lang="en-US"/>
-            </a:p>
-          </p:txBody>
-        </p:sp>
-        <p:sp>
-          <p:nvSpPr>
-            <p:cNvPr id="24" name="TextBox 23">
-              <a:extLst>
-                <a:ext uri="{FF2B5EF4-FFF2-40B4-BE49-F238E27FC236}">
-                  <a16:creationId xmlns:a16="http://schemas.microsoft.com/office/drawing/2014/main" id="{8E74F926-AEB0-CB45-C34C-2A14A44ED625}"/>
-                </a:ext>
-              </a:extLst>
-            </p:cNvPr>
-            <p:cNvSpPr txBox="1"/>
-            <p:nvPr/>
-          </p:nvSpPr>
-          <p:spPr>
-            <a:xfrm>
-              <a:off x="8618216" y="1219173"/>
-              <a:ext cx="263077" cy="273672"/>
-            </a:xfrm>
-            <a:prstGeom prst="rect">
-              <a:avLst/>
-            </a:prstGeom>
-          </p:spPr>
-          <p:style>
-            <a:lnRef idx="1">
-              <a:schemeClr val="accent1"/>
-            </a:lnRef>
-            <a:fillRef idx="3">
-              <a:schemeClr val="accent1"/>
-            </a:fillRef>
-            <a:effectRef idx="2">
-              <a:schemeClr val="accent1"/>
-            </a:effectRef>
-            <a:fontRef idx="minor">
-              <a:schemeClr val="lt1"/>
-            </a:fontRef>
-          </p:style>
-          <p:txBody>
-            <a:bodyPr wrap="square" rtlCol="0">
-              <a:spAutoFit/>
-            </a:bodyPr>
-            <a:lstStyle/>
-            <a:p>
-              <a:r>
-                <a:rPr lang="en-US" i="1" dirty="0"/>
-                <a:t>a</a:t>
-              </a:r>
-            </a:p>
-          </p:txBody>
-        </p:sp>
-        <p:sp>
-          <p:nvSpPr>
-            <p:cNvPr id="25" name="TextBox 24">
-              <a:extLst>
-                <a:ext uri="{FF2B5EF4-FFF2-40B4-BE49-F238E27FC236}">
-                  <a16:creationId xmlns:a16="http://schemas.microsoft.com/office/drawing/2014/main" id="{D4A403C4-E1B6-7B27-49A0-0E470B9A6764}"/>
-                </a:ext>
-              </a:extLst>
-            </p:cNvPr>
-            <p:cNvSpPr txBox="1"/>
-            <p:nvPr/>
-          </p:nvSpPr>
-          <p:spPr>
-            <a:xfrm>
-              <a:off x="8632512" y="2328757"/>
-              <a:ext cx="263077" cy="273672"/>
-            </a:xfrm>
-            <a:prstGeom prst="rect">
-              <a:avLst/>
-            </a:prstGeom>
-          </p:spPr>
-          <p:style>
-            <a:lnRef idx="1">
-              <a:schemeClr val="accent1"/>
-            </a:lnRef>
-            <a:fillRef idx="3">
-              <a:schemeClr val="accent1"/>
-            </a:fillRef>
-            <a:effectRef idx="2">
-              <a:schemeClr val="accent1"/>
-            </a:effectRef>
-            <a:fontRef idx="minor">
-              <a:schemeClr val="lt1"/>
-            </a:fontRef>
-          </p:style>
-          <p:txBody>
-            <a:bodyPr wrap="square" rtlCol="0">
-              <a:spAutoFit/>
-            </a:bodyPr>
-            <a:lstStyle/>
-            <a:p>
-              <a:r>
-                <a:rPr lang="en-US" i="1" dirty="0"/>
-                <a:t>b</a:t>
-              </a:r>
-            </a:p>
-          </p:txBody>
-        </p:sp>
-        <p:sp>
-          <p:nvSpPr>
-            <p:cNvPr id="26" name="TextBox 25">
-              <a:extLst>
-                <a:ext uri="{FF2B5EF4-FFF2-40B4-BE49-F238E27FC236}">
-                  <a16:creationId xmlns:a16="http://schemas.microsoft.com/office/drawing/2014/main" id="{63CF1763-F1A9-D83F-4DCE-D1A16BDE7DE9}"/>
-                </a:ext>
-              </a:extLst>
-            </p:cNvPr>
-            <p:cNvSpPr txBox="1"/>
-            <p:nvPr/>
-          </p:nvSpPr>
-          <p:spPr>
-            <a:xfrm>
-              <a:off x="10029190" y="957775"/>
-              <a:ext cx="326607" cy="369332"/>
-            </a:xfrm>
-            <a:prstGeom prst="rect">
-              <a:avLst/>
-            </a:prstGeom>
-          </p:spPr>
-          <p:style>
-            <a:lnRef idx="1">
-              <a:schemeClr val="accent1"/>
-            </a:lnRef>
-            <a:fillRef idx="3">
-              <a:schemeClr val="accent1"/>
-            </a:fillRef>
-            <a:effectRef idx="2">
-              <a:schemeClr val="accent1"/>
-            </a:effectRef>
-            <a:fontRef idx="minor">
-              <a:schemeClr val="lt1"/>
-            </a:fontRef>
-          </p:style>
-          <p:txBody>
-            <a:bodyPr wrap="square" rtlCol="0">
-              <a:spAutoFit/>
-            </a:bodyPr>
-            <a:lstStyle/>
-            <a:p>
-              <a:r>
-                <a:rPr lang="en-US" i="1" dirty="0"/>
-                <a:t>c</a:t>
-              </a:r>
-            </a:p>
-          </p:txBody>
-        </p:sp>
-        <p:sp>
-          <p:nvSpPr>
-            <p:cNvPr id="27" name="TextBox 26">
-              <a:extLst>
-                <a:ext uri="{FF2B5EF4-FFF2-40B4-BE49-F238E27FC236}">
-                  <a16:creationId xmlns:a16="http://schemas.microsoft.com/office/drawing/2014/main" id="{555AA57E-229C-67C4-A44C-CF5FE988DE9E}"/>
-                </a:ext>
-              </a:extLst>
-            </p:cNvPr>
-            <p:cNvSpPr txBox="1"/>
-            <p:nvPr/>
-          </p:nvSpPr>
-          <p:spPr>
-            <a:xfrm>
-              <a:off x="10051344" y="1745809"/>
-              <a:ext cx="299077" cy="369332"/>
-            </a:xfrm>
-            <a:prstGeom prst="rect">
-              <a:avLst/>
-            </a:prstGeom>
-          </p:spPr>
-          <p:style>
-            <a:lnRef idx="1">
-              <a:schemeClr val="accent1"/>
-            </a:lnRef>
-            <a:fillRef idx="3">
-              <a:schemeClr val="accent1"/>
-            </a:fillRef>
-            <a:effectRef idx="2">
-              <a:schemeClr val="accent1"/>
-            </a:effectRef>
-            <a:fontRef idx="minor">
-              <a:schemeClr val="lt1"/>
-            </a:fontRef>
-          </p:style>
-          <p:txBody>
-            <a:bodyPr wrap="square" rtlCol="0">
-              <a:spAutoFit/>
-            </a:bodyPr>
-            <a:lstStyle/>
-            <a:p>
-              <a:r>
-                <a:rPr lang="en-US" i="1" dirty="0"/>
-                <a:t>d</a:t>
-              </a:r>
-            </a:p>
-          </p:txBody>
-        </p:sp>
-        <p:sp>
-          <p:nvSpPr>
-            <p:cNvPr id="28" name="TextBox 27">
-              <a:extLst>
-                <a:ext uri="{FF2B5EF4-FFF2-40B4-BE49-F238E27FC236}">
-                  <a16:creationId xmlns:a16="http://schemas.microsoft.com/office/drawing/2014/main" id="{28803BFF-D706-FEDF-6A3B-C4D1E4F94AF5}"/>
-                </a:ext>
-              </a:extLst>
-            </p:cNvPr>
-            <p:cNvSpPr txBox="1"/>
-            <p:nvPr/>
-          </p:nvSpPr>
-          <p:spPr>
-            <a:xfrm>
-              <a:off x="10051343" y="2533842"/>
-              <a:ext cx="299077" cy="369332"/>
-            </a:xfrm>
-            <a:prstGeom prst="rect">
-              <a:avLst/>
-            </a:prstGeom>
-          </p:spPr>
-          <p:style>
-            <a:lnRef idx="1">
-              <a:schemeClr val="accent1"/>
-            </a:lnRef>
-            <a:fillRef idx="3">
-              <a:schemeClr val="accent1"/>
-            </a:fillRef>
-            <a:effectRef idx="2">
-              <a:schemeClr val="accent1"/>
-            </a:effectRef>
-            <a:fontRef idx="minor">
-              <a:schemeClr val="lt1"/>
-            </a:fontRef>
-          </p:style>
-          <p:txBody>
-            <a:bodyPr wrap="square" rtlCol="0">
-              <a:spAutoFit/>
-            </a:bodyPr>
-            <a:lstStyle/>
-            <a:p>
-              <a:r>
-                <a:rPr lang="en-US" i="1" dirty="0"/>
-                <a:t>e</a:t>
-              </a:r>
-            </a:p>
-          </p:txBody>
-        </p:sp>
-        <p:sp>
-          <p:nvSpPr>
-            <p:cNvPr id="29" name="TextBox 28">
-              <a:extLst>
-                <a:ext uri="{FF2B5EF4-FFF2-40B4-BE49-F238E27FC236}">
-                  <a16:creationId xmlns:a16="http://schemas.microsoft.com/office/drawing/2014/main" id="{C7CABE3E-E462-C660-0A67-7A34E2CACA42}"/>
-                </a:ext>
-              </a:extLst>
-            </p:cNvPr>
-            <p:cNvSpPr txBox="1"/>
-            <p:nvPr/>
-          </p:nvSpPr>
-          <p:spPr>
-            <a:xfrm>
-              <a:off x="7422270" y="1809293"/>
-              <a:ext cx="263077" cy="273672"/>
-            </a:xfrm>
-            <a:prstGeom prst="rect">
-              <a:avLst/>
-            </a:prstGeom>
-          </p:spPr>
-          <p:style>
-            <a:lnRef idx="1">
-              <a:schemeClr val="accent1"/>
-            </a:lnRef>
-            <a:fillRef idx="3">
-              <a:schemeClr val="accent1"/>
-            </a:fillRef>
-            <a:effectRef idx="2">
-              <a:schemeClr val="accent1"/>
-            </a:effectRef>
-            <a:fontRef idx="minor">
-              <a:schemeClr val="lt1"/>
-            </a:fontRef>
-          </p:style>
-          <p:txBody>
-            <a:bodyPr wrap="square" rtlCol="0">
-              <a:spAutoFit/>
-            </a:bodyPr>
-            <a:lstStyle/>
-            <a:p>
-              <a:r>
-                <a:rPr lang="en-US" i="1" dirty="0"/>
-                <a:t>s</a:t>
-              </a:r>
-            </a:p>
-          </p:txBody>
-        </p:sp>
-        <p:cxnSp>
-          <p:nvCxnSpPr>
-            <p:cNvPr id="70" name="Straight Arrow Connector 69">
-              <a:extLst>
-                <a:ext uri="{FF2B5EF4-FFF2-40B4-BE49-F238E27FC236}">
-                  <a16:creationId xmlns:a16="http://schemas.microsoft.com/office/drawing/2014/main" id="{735FF4D0-04EA-A88D-118C-FC13BD02CBD3}"/>
+                  <a16:creationId xmlns:a16="http://schemas.microsoft.com/office/drawing/2014/main" id="{0A4F5075-39D1-5065-2926-93366224F264}"/>
                 </a:ext>
               </a:extLst>
             </p:cNvPr>
@@ -4891,8 +4965,8 @@
           </p:nvCxnSpPr>
           <p:spPr>
             <a:xfrm flipV="1">
-              <a:off x="7752063" y="1474962"/>
-              <a:ext cx="758914" cy="444663"/>
+              <a:off x="10092565" y="1298663"/>
+              <a:ext cx="966606" cy="79895"/>
             </a:xfrm>
             <a:prstGeom prst="straightConnector1">
               <a:avLst/>
@@ -4918,10 +4992,10 @@
         </p:cxnSp>
         <p:cxnSp>
           <p:nvCxnSpPr>
-            <p:cNvPr id="75" name="Straight Arrow Connector 74">
+            <p:cNvPr id="84" name="Straight Arrow Connector 83">
               <a:extLst>
                 <a:ext uri="{FF2B5EF4-FFF2-40B4-BE49-F238E27FC236}">
-                  <a16:creationId xmlns:a16="http://schemas.microsoft.com/office/drawing/2014/main" id="{638E3A6F-790C-AAA2-6736-029FBB0C4FB1}"/>
+                  <a16:creationId xmlns:a16="http://schemas.microsoft.com/office/drawing/2014/main" id="{68D007CE-0C32-A1A9-8175-5A691FBC9662}"/>
                 </a:ext>
               </a:extLst>
             </p:cNvPr>
@@ -4932,8 +5006,8 @@
           </p:nvCxnSpPr>
           <p:spPr>
             <a:xfrm>
-              <a:off x="7740873" y="2056461"/>
-              <a:ext cx="770104" cy="307353"/>
+              <a:off x="10105169" y="1530886"/>
+              <a:ext cx="1059689" cy="1176257"/>
             </a:xfrm>
             <a:prstGeom prst="straightConnector1">
               <a:avLst/>
@@ -4957,295 +5031,47 @@
             </a:fontRef>
           </p:style>
         </p:cxnSp>
-        <p:grpSp>
-          <p:nvGrpSpPr>
-            <p:cNvPr id="81" name="Group 80">
+        <p:cxnSp>
+          <p:nvCxnSpPr>
+            <p:cNvPr id="85" name="Straight Arrow Connector 84">
               <a:extLst>
                 <a:ext uri="{FF2B5EF4-FFF2-40B4-BE49-F238E27FC236}">
-                  <a16:creationId xmlns:a16="http://schemas.microsoft.com/office/drawing/2014/main" id="{04246876-D5E3-B596-31A3-B29FF94251E6}"/>
+                  <a16:creationId xmlns:a16="http://schemas.microsoft.com/office/drawing/2014/main" id="{59643340-BDCC-E4B5-08CE-1AD9893BD711}"/>
                 </a:ext>
               </a:extLst>
             </p:cNvPr>
-            <p:cNvGrpSpPr/>
+            <p:cNvCxnSpPr>
+              <a:cxnSpLocks/>
+            </p:cNvCxnSpPr>
             <p:nvPr/>
-          </p:nvGrpSpPr>
-          <p:grpSpPr>
+          </p:nvCxnSpPr>
+          <p:spPr>
             <a:xfrm>
-              <a:off x="8940098" y="1142441"/>
-              <a:ext cx="1089092" cy="1486202"/>
-              <a:chOff x="8940098" y="1142441"/>
-              <a:chExt cx="1089092" cy="1486202"/>
+              <a:off x="10114718" y="1450551"/>
+              <a:ext cx="1008134" cy="448426"/>
             </a:xfrm>
-          </p:grpSpPr>
-          <p:cxnSp>
-            <p:nvCxnSpPr>
-              <p:cNvPr id="71" name="Straight Arrow Connector 70">
-                <a:extLst>
-                  <a:ext uri="{FF2B5EF4-FFF2-40B4-BE49-F238E27FC236}">
-                    <a16:creationId xmlns:a16="http://schemas.microsoft.com/office/drawing/2014/main" id="{FA5AFAC7-6357-1F3F-0EC6-C396462D1EBE}"/>
-                  </a:ext>
-                </a:extLst>
-              </p:cNvPr>
-              <p:cNvCxnSpPr>
-                <a:cxnSpLocks/>
-                <a:endCxn id="26" idx="1"/>
-              </p:cNvCxnSpPr>
-              <p:nvPr/>
-            </p:nvCxnSpPr>
-            <p:spPr>
-              <a:xfrm flipV="1">
-                <a:off x="8940098" y="1142441"/>
-                <a:ext cx="1089092" cy="216477"/>
-              </a:xfrm>
-              <a:prstGeom prst="straightConnector1">
-                <a:avLst/>
-              </a:prstGeom>
-              <a:ln>
-                <a:tailEnd type="triangle"/>
-              </a:ln>
-            </p:spPr>
-            <p:style>
-              <a:lnRef idx="3">
-                <a:schemeClr val="accent4"/>
-              </a:lnRef>
-              <a:fillRef idx="0">
-                <a:schemeClr val="accent4"/>
-              </a:fillRef>
-              <a:effectRef idx="2">
-                <a:schemeClr val="accent4"/>
-              </a:effectRef>
-              <a:fontRef idx="minor">
-                <a:schemeClr val="tx1"/>
-              </a:fontRef>
-            </p:style>
-          </p:cxnSp>
-          <p:cxnSp>
-            <p:nvCxnSpPr>
-              <p:cNvPr id="77" name="Straight Arrow Connector 76">
-                <a:extLst>
-                  <a:ext uri="{FF2B5EF4-FFF2-40B4-BE49-F238E27FC236}">
-                    <a16:creationId xmlns:a16="http://schemas.microsoft.com/office/drawing/2014/main" id="{D1E7E9AA-77DE-82AE-8055-2E763603015F}"/>
-                  </a:ext>
-                </a:extLst>
-              </p:cNvPr>
-              <p:cNvCxnSpPr>
-                <a:cxnSpLocks/>
-              </p:cNvCxnSpPr>
-              <p:nvPr/>
-            </p:nvCxnSpPr>
-            <p:spPr>
-              <a:xfrm>
-                <a:off x="8966361" y="1452386"/>
-                <a:ext cx="1059689" cy="1176257"/>
-              </a:xfrm>
-              <a:prstGeom prst="straightConnector1">
-                <a:avLst/>
-              </a:prstGeom>
-              <a:ln>
-                <a:tailEnd type="triangle"/>
-              </a:ln>
-            </p:spPr>
-            <p:style>
-              <a:lnRef idx="3">
-                <a:schemeClr val="accent4"/>
-              </a:lnRef>
-              <a:fillRef idx="0">
-                <a:schemeClr val="accent4"/>
-              </a:fillRef>
-              <a:effectRef idx="2">
-                <a:schemeClr val="accent4"/>
-              </a:effectRef>
-              <a:fontRef idx="minor">
-                <a:schemeClr val="tx1"/>
-              </a:fontRef>
-            </p:style>
-          </p:cxnSp>
-          <p:cxnSp>
-            <p:nvCxnSpPr>
-              <p:cNvPr id="79" name="Straight Arrow Connector 78">
-                <a:extLst>
-                  <a:ext uri="{FF2B5EF4-FFF2-40B4-BE49-F238E27FC236}">
-                    <a16:creationId xmlns:a16="http://schemas.microsoft.com/office/drawing/2014/main" id="{2D338E16-67F1-18E6-319A-95709A7178BF}"/>
-                  </a:ext>
-                </a:extLst>
-              </p:cNvPr>
-              <p:cNvCxnSpPr>
-                <a:cxnSpLocks/>
-              </p:cNvCxnSpPr>
-              <p:nvPr/>
-            </p:nvCxnSpPr>
-            <p:spPr>
-              <a:xfrm>
-                <a:off x="8989162" y="1399086"/>
-                <a:ext cx="1008134" cy="448426"/>
-              </a:xfrm>
-              <a:prstGeom prst="straightConnector1">
-                <a:avLst/>
-              </a:prstGeom>
-              <a:ln>
-                <a:tailEnd type="triangle"/>
-              </a:ln>
-            </p:spPr>
-            <p:style>
-              <a:lnRef idx="3">
-                <a:schemeClr val="accent4"/>
-              </a:lnRef>
-              <a:fillRef idx="0">
-                <a:schemeClr val="accent4"/>
-              </a:fillRef>
-              <a:effectRef idx="2">
-                <a:schemeClr val="accent4"/>
-              </a:effectRef>
-              <a:fontRef idx="minor">
-                <a:schemeClr val="tx1"/>
-              </a:fontRef>
-            </p:style>
-          </p:cxnSp>
-        </p:grpSp>
-        <p:grpSp>
-          <p:nvGrpSpPr>
-            <p:cNvPr id="82" name="Group 81">
-              <a:extLst>
-                <a:ext uri="{FF2B5EF4-FFF2-40B4-BE49-F238E27FC236}">
-                  <a16:creationId xmlns:a16="http://schemas.microsoft.com/office/drawing/2014/main" id="{4C025BC0-2811-3273-CD49-75B0C8702EA2}"/>
-                </a:ext>
-              </a:extLst>
-            </p:cNvPr>
-            <p:cNvGrpSpPr/>
-            <p:nvPr/>
-          </p:nvGrpSpPr>
-          <p:grpSpPr>
-            <a:xfrm flipV="1">
-              <a:off x="8938405" y="1293461"/>
-              <a:ext cx="1073985" cy="1461175"/>
-              <a:chOff x="10092565" y="1162080"/>
-              <a:chExt cx="1089092" cy="1545063"/>
-            </a:xfrm>
-          </p:grpSpPr>
-          <p:cxnSp>
-            <p:nvCxnSpPr>
-              <p:cNvPr id="83" name="Straight Arrow Connector 82">
-                <a:extLst>
-                  <a:ext uri="{FF2B5EF4-FFF2-40B4-BE49-F238E27FC236}">
-                    <a16:creationId xmlns:a16="http://schemas.microsoft.com/office/drawing/2014/main" id="{0A4F5075-39D1-5065-2926-93366224F264}"/>
-                  </a:ext>
-                </a:extLst>
-              </p:cNvPr>
-              <p:cNvCxnSpPr>
-                <a:cxnSpLocks/>
-              </p:cNvCxnSpPr>
-              <p:nvPr/>
-            </p:nvCxnSpPr>
-            <p:spPr>
-              <a:xfrm flipV="1">
-                <a:off x="10092565" y="1162080"/>
-                <a:ext cx="1089092" cy="216477"/>
-              </a:xfrm>
-              <a:prstGeom prst="straightConnector1">
-                <a:avLst/>
-              </a:prstGeom>
-              <a:ln>
-                <a:tailEnd type="triangle"/>
-              </a:ln>
-            </p:spPr>
-            <p:style>
-              <a:lnRef idx="3">
-                <a:schemeClr val="accent4"/>
-              </a:lnRef>
-              <a:fillRef idx="0">
-                <a:schemeClr val="accent4"/>
-              </a:fillRef>
-              <a:effectRef idx="2">
-                <a:schemeClr val="accent4"/>
-              </a:effectRef>
-              <a:fontRef idx="minor">
-                <a:schemeClr val="tx1"/>
-              </a:fontRef>
-            </p:style>
-          </p:cxnSp>
-          <p:cxnSp>
-            <p:nvCxnSpPr>
-              <p:cNvPr id="84" name="Straight Arrow Connector 83">
-                <a:extLst>
-                  <a:ext uri="{FF2B5EF4-FFF2-40B4-BE49-F238E27FC236}">
-                    <a16:creationId xmlns:a16="http://schemas.microsoft.com/office/drawing/2014/main" id="{68D007CE-0C32-A1A9-8175-5A691FBC9662}"/>
-                  </a:ext>
-                </a:extLst>
-              </p:cNvPr>
-              <p:cNvCxnSpPr>
-                <a:cxnSpLocks/>
-              </p:cNvCxnSpPr>
-              <p:nvPr/>
-            </p:nvCxnSpPr>
-            <p:spPr>
-              <a:xfrm>
-                <a:off x="10105169" y="1530886"/>
-                <a:ext cx="1059689" cy="1176257"/>
-              </a:xfrm>
-              <a:prstGeom prst="straightConnector1">
-                <a:avLst/>
-              </a:prstGeom>
-              <a:ln>
-                <a:tailEnd type="triangle"/>
-              </a:ln>
-            </p:spPr>
-            <p:style>
-              <a:lnRef idx="3">
-                <a:schemeClr val="accent4"/>
-              </a:lnRef>
-              <a:fillRef idx="0">
-                <a:schemeClr val="accent4"/>
-              </a:fillRef>
-              <a:effectRef idx="2">
-                <a:schemeClr val="accent4"/>
-              </a:effectRef>
-              <a:fontRef idx="minor">
-                <a:schemeClr val="tx1"/>
-              </a:fontRef>
-            </p:style>
-          </p:cxnSp>
-          <p:cxnSp>
-            <p:nvCxnSpPr>
-              <p:cNvPr id="85" name="Straight Arrow Connector 84">
-                <a:extLst>
-                  <a:ext uri="{FF2B5EF4-FFF2-40B4-BE49-F238E27FC236}">
-                    <a16:creationId xmlns:a16="http://schemas.microsoft.com/office/drawing/2014/main" id="{59643340-BDCC-E4B5-08CE-1AD9893BD711}"/>
-                  </a:ext>
-                </a:extLst>
-              </p:cNvPr>
-              <p:cNvCxnSpPr>
-                <a:cxnSpLocks/>
-              </p:cNvCxnSpPr>
-              <p:nvPr/>
-            </p:nvCxnSpPr>
-            <p:spPr>
-              <a:xfrm>
-                <a:off x="10114718" y="1490838"/>
-                <a:ext cx="1008134" cy="448426"/>
-              </a:xfrm>
-              <a:prstGeom prst="straightConnector1">
-                <a:avLst/>
-              </a:prstGeom>
-              <a:ln>
-                <a:tailEnd type="triangle"/>
-              </a:ln>
-            </p:spPr>
-            <p:style>
-              <a:lnRef idx="3">
-                <a:schemeClr val="accent4"/>
-              </a:lnRef>
-              <a:fillRef idx="0">
-                <a:schemeClr val="accent4"/>
-              </a:fillRef>
-              <a:effectRef idx="2">
-                <a:schemeClr val="accent4"/>
-              </a:effectRef>
-              <a:fontRef idx="minor">
-                <a:schemeClr val="tx1"/>
-              </a:fontRef>
-            </p:style>
-          </p:cxnSp>
-        </p:grpSp>
+            <a:prstGeom prst="straightConnector1">
+              <a:avLst/>
+            </a:prstGeom>
+            <a:ln>
+              <a:tailEnd type="triangle"/>
+            </a:ln>
+          </p:spPr>
+          <p:style>
+            <a:lnRef idx="3">
+              <a:schemeClr val="accent4"/>
+            </a:lnRef>
+            <a:fillRef idx="0">
+              <a:schemeClr val="accent4"/>
+            </a:fillRef>
+            <a:effectRef idx="2">
+              <a:schemeClr val="accent4"/>
+            </a:effectRef>
+            <a:fontRef idx="minor">
+              <a:schemeClr val="tx1"/>
+            </a:fontRef>
+          </p:style>
+        </p:cxnSp>
       </p:grpSp>
       <p:sp>
         <p:nvSpPr>
@@ -5261,13 +5087,13 @@
         </p:nvSpPr>
         <p:spPr>
           <a:xfrm>
-            <a:off x="6096000" y="95505"/>
+            <a:off x="6091173" y="190594"/>
             <a:ext cx="3140765" cy="859514"/>
           </a:xfrm>
           <a:prstGeom prst="wedgeEllipseCallout">
             <a:avLst>
-              <a:gd name="adj1" fmla="val 13754"/>
-              <a:gd name="adj2" fmla="val 122897"/>
+              <a:gd name="adj1" fmla="val 19617"/>
+              <a:gd name="adj2" fmla="val 104427"/>
             </a:avLst>
           </a:prstGeom>
           <a:noFill/>
@@ -5332,13 +5158,13 @@
         </p:nvSpPr>
         <p:spPr>
           <a:xfrm>
-            <a:off x="7199484" y="3095313"/>
+            <a:off x="6496573" y="3068799"/>
             <a:ext cx="3140765" cy="859514"/>
           </a:xfrm>
           <a:prstGeom prst="wedgeEllipseCallout">
             <a:avLst>
-              <a:gd name="adj1" fmla="val 20083"/>
-              <a:gd name="adj2" fmla="val -94500"/>
+              <a:gd name="adj1" fmla="val 33427"/>
+              <a:gd name="adj2" fmla="val -83418"/>
             </a:avLst>
           </a:prstGeom>
           <a:noFill/>
@@ -5377,13 +5203,13 @@
             </a:r>
             <a:r>
               <a:rPr lang="en-US" dirty="0" err="1"/>
-              <a:t>b</a:t>
+              <a:t>c</a:t>
             </a:r>
             <a:r>
               <a:rPr lang="en-US" dirty="0" err="1">
                 <a:sym typeface="Wingdings" pitchFamily="2" charset="2"/>
               </a:rPr>
-              <a:t>e</a:t>
+              <a:t>g</a:t>
             </a:r>
             <a:endParaRPr lang="en-US" dirty="0"/>
           </a:p>
@@ -5403,7 +5229,7 @@
         </p:nvSpPr>
         <p:spPr>
           <a:xfrm rot="19815816">
-            <a:off x="7857867" y="1672783"/>
+            <a:off x="7570000" y="1574424"/>
             <a:ext cx="689113" cy="276999"/>
           </a:xfrm>
           <a:prstGeom prst="rect">
@@ -5423,7 +5249,7 @@
                 <a:latin typeface="Cambria Math" panose="02040503050406030204" pitchFamily="18" charset="0"/>
                 <a:ea typeface="Cambria Math" panose="02040503050406030204" pitchFamily="18" charset="0"/>
               </a:rPr>
-              <a:t>0.1</a:t>
+              <a:t>0.9</a:t>
             </a:r>
           </a:p>
         </p:txBody>
@@ -5441,8 +5267,8 @@
           <p:nvPr/>
         </p:nvSpPr>
         <p:spPr>
-          <a:xfrm rot="927199">
-            <a:off x="7986812" y="1984221"/>
+          <a:xfrm rot="1773497">
+            <a:off x="7808798" y="2274146"/>
             <a:ext cx="689113" cy="276999"/>
           </a:xfrm>
           <a:prstGeom prst="rect">
@@ -5462,124 +5288,7 @@
                 <a:latin typeface="Cambria Math" panose="02040503050406030204" pitchFamily="18" charset="0"/>
                 <a:ea typeface="Cambria Math" panose="02040503050406030204" pitchFamily="18" charset="0"/>
               </a:rPr>
-              <a:t>0.1</a:t>
-            </a:r>
-          </a:p>
-        </p:txBody>
-      </p:sp>
-      <p:sp>
-        <p:nvSpPr>
-          <p:cNvPr id="92" name="TextBox 91">
-            <a:extLst>
-              <a:ext uri="{FF2B5EF4-FFF2-40B4-BE49-F238E27FC236}">
-                <a16:creationId xmlns:a16="http://schemas.microsoft.com/office/drawing/2014/main" id="{E2096AC0-7B48-A20B-CE2A-0B2903D53299}"/>
-              </a:ext>
-            </a:extLst>
-          </p:cNvPr>
-          <p:cNvSpPr txBox="1"/>
-          <p:nvPr/>
-        </p:nvSpPr>
-        <p:spPr>
-          <a:xfrm rot="476796">
-            <a:off x="9222884" y="2374525"/>
-            <a:ext cx="689113" cy="276999"/>
-          </a:xfrm>
-          <a:prstGeom prst="rect">
-            <a:avLst/>
-          </a:prstGeom>
-          <a:noFill/>
-        </p:spPr>
-        <p:txBody>
-          <a:bodyPr wrap="square" rtlCol="0">
-            <a:spAutoFit/>
-          </a:bodyPr>
-          <a:lstStyle/>
-          <a:p>
-            <a:pPr algn="ctr"/>
-            <a:r>
-              <a:rPr lang="en-US" sz="1200" dirty="0">
-                <a:latin typeface="Cambria Math" panose="02040503050406030204" pitchFamily="18" charset="0"/>
-                <a:ea typeface="Cambria Math" panose="02040503050406030204" pitchFamily="18" charset="0"/>
-              </a:rPr>
-              <a:t>0.15</a:t>
-            </a:r>
-          </a:p>
-        </p:txBody>
-      </p:sp>
-      <p:sp>
-        <p:nvSpPr>
-          <p:cNvPr id="93" name="TextBox 92">
-            <a:extLst>
-              <a:ext uri="{FF2B5EF4-FFF2-40B4-BE49-F238E27FC236}">
-                <a16:creationId xmlns:a16="http://schemas.microsoft.com/office/drawing/2014/main" id="{8CB12913-86BC-A540-F7F9-DFA87E2A6399}"/>
-              </a:ext>
-            </a:extLst>
-          </p:cNvPr>
-          <p:cNvSpPr txBox="1"/>
-          <p:nvPr/>
-        </p:nvSpPr>
-        <p:spPr>
-          <a:xfrm rot="20700000">
-            <a:off x="9140088" y="925203"/>
-            <a:ext cx="689113" cy="276999"/>
-          </a:xfrm>
-          <a:prstGeom prst="rect">
-            <a:avLst/>
-          </a:prstGeom>
-          <a:noFill/>
-        </p:spPr>
-        <p:txBody>
-          <a:bodyPr wrap="square" rtlCol="0">
-            <a:spAutoFit/>
-          </a:bodyPr>
-          <a:lstStyle/>
-          <a:p>
-            <a:pPr algn="ctr"/>
-            <a:r>
-              <a:rPr lang="en-US" sz="1200" dirty="0">
-                <a:latin typeface="Cambria Math" panose="02040503050406030204" pitchFamily="18" charset="0"/>
-                <a:ea typeface="Cambria Math" panose="02040503050406030204" pitchFamily="18" charset="0"/>
-              </a:rPr>
-              <a:t>0.11</a:t>
-            </a:r>
-          </a:p>
-        </p:txBody>
-      </p:sp>
-      <p:sp>
-        <p:nvSpPr>
-          <p:cNvPr id="94" name="TextBox 93">
-            <a:extLst>
-              <a:ext uri="{FF2B5EF4-FFF2-40B4-BE49-F238E27FC236}">
-                <a16:creationId xmlns:a16="http://schemas.microsoft.com/office/drawing/2014/main" id="{4BDF78E5-2965-9A8F-9105-8EA9F9A18775}"/>
-              </a:ext>
-            </a:extLst>
-          </p:cNvPr>
-          <p:cNvSpPr txBox="1"/>
-          <p:nvPr/>
-        </p:nvSpPr>
-        <p:spPr>
-          <a:xfrm rot="900000">
-            <a:off x="9112770" y="1342350"/>
-            <a:ext cx="689113" cy="276999"/>
-          </a:xfrm>
-          <a:prstGeom prst="rect">
-            <a:avLst/>
-          </a:prstGeom>
-          <a:noFill/>
-        </p:spPr>
-        <p:txBody>
-          <a:bodyPr wrap="square" rtlCol="0">
-            <a:spAutoFit/>
-          </a:bodyPr>
-          <a:lstStyle/>
-          <a:p>
-            <a:pPr algn="ctr"/>
-            <a:r>
-              <a:rPr lang="en-US" sz="1200" dirty="0">
-                <a:latin typeface="Cambria Math" panose="02040503050406030204" pitchFamily="18" charset="0"/>
-                <a:ea typeface="Cambria Math" panose="02040503050406030204" pitchFamily="18" charset="0"/>
-              </a:rPr>
-              <a:t>…</a:t>
+              <a:t>0.05</a:t>
             </a:r>
           </a:p>
         </p:txBody>
@@ -5714,7 +5423,7 @@
         <p:spPr>
           <a:xfrm>
             <a:off x="727995" y="4575405"/>
-            <a:ext cx="4280741" cy="1192694"/>
+            <a:ext cx="4467885" cy="1477328"/>
           </a:xfrm>
           <a:prstGeom prst="rect">
             <a:avLst/>
@@ -5749,7 +5458,7 @@
             <a:pPr algn="ctr"/>
             <a:r>
               <a:rPr lang="en-US" dirty="0"/>
-              <a:t>The physical layout of a double slit experiment.  Photons from a flashlight (s) can go through slits (a, or b) and then to one of three photon detectors (c, d, or e).  </a:t>
+              <a:t>The physical layout of a double slit experiment.  Photons from a flashlight (s) can go through slits (b or c) and then to one of three photon detectors (e, f, g).  (a) is an opaque screen and (d) is a backdrop.  </a:t>
             </a:r>
           </a:p>
         </p:txBody>
@@ -5804,17 +5513,17 @@
             <a:pPr algn="ctr"/>
             <a:r>
               <a:rPr lang="en-US" dirty="0"/>
-              <a:t>A simplified view of the paths that particles can take from the start (s) to a detector (c, d, or e).</a:t>
-            </a:r>
-          </a:p>
-        </p:txBody>
-      </p:sp>
-      <p:sp>
-        <p:nvSpPr>
-          <p:cNvPr id="2" name="Triangle 1">
-            <a:extLst>
-              <a:ext uri="{FF2B5EF4-FFF2-40B4-BE49-F238E27FC236}">
-                <a16:creationId xmlns:a16="http://schemas.microsoft.com/office/drawing/2014/main" id="{71E27C64-ED80-D94B-DE78-8419A18BE62E}"/>
+              <a:t>A simplified view of the paths that particles can take from the start (s) to the detector (e, f, g).</a:t>
+            </a:r>
+          </a:p>
+        </p:txBody>
+      </p:sp>
+      <p:sp>
+        <p:nvSpPr>
+          <p:cNvPr id="4" name="Triangle 3">
+            <a:extLst>
+              <a:ext uri="{FF2B5EF4-FFF2-40B4-BE49-F238E27FC236}">
+                <a16:creationId xmlns:a16="http://schemas.microsoft.com/office/drawing/2014/main" id="{9294DAF0-64EE-EA30-4535-6641ADDC6AB5}"/>
               </a:ext>
             </a:extLst>
           </p:cNvPr>
@@ -5823,7 +5532,7 @@
         </p:nvSpPr>
         <p:spPr>
           <a:xfrm rot="16200000">
-            <a:off x="893527" y="1441348"/>
+            <a:off x="2857423" y="827777"/>
             <a:ext cx="2067039" cy="1417752"/>
           </a:xfrm>
           <a:prstGeom prst="triangle">
@@ -5865,10 +5574,10 @@
       </p:sp>
       <p:sp>
         <p:nvSpPr>
-          <p:cNvPr id="4" name="Triangle 3">
-            <a:extLst>
-              <a:ext uri="{FF2B5EF4-FFF2-40B4-BE49-F238E27FC236}">
-                <a16:creationId xmlns:a16="http://schemas.microsoft.com/office/drawing/2014/main" id="{9294DAF0-64EE-EA30-4535-6641ADDC6AB5}"/>
+          <p:cNvPr id="5" name="Triangle 4">
+            <a:extLst>
+              <a:ext uri="{FF2B5EF4-FFF2-40B4-BE49-F238E27FC236}">
+                <a16:creationId xmlns:a16="http://schemas.microsoft.com/office/drawing/2014/main" id="{779731F1-937B-0A0E-92FE-403ADE6B0028}"/>
               </a:ext>
             </a:extLst>
           </p:cNvPr>
@@ -5877,7 +5586,7 @@
         </p:nvSpPr>
         <p:spPr>
           <a:xfrm rot="16200000">
-            <a:off x="2914500" y="785420"/>
+            <a:off x="2834636" y="2028452"/>
             <a:ext cx="2067039" cy="1417752"/>
           </a:xfrm>
           <a:prstGeom prst="triangle">
@@ -5919,10 +5628,10 @@
       </p:sp>
       <p:sp>
         <p:nvSpPr>
-          <p:cNvPr id="5" name="Triangle 4">
-            <a:extLst>
-              <a:ext uri="{FF2B5EF4-FFF2-40B4-BE49-F238E27FC236}">
-                <a16:creationId xmlns:a16="http://schemas.microsoft.com/office/drawing/2014/main" id="{779731F1-937B-0A0E-92FE-403ADE6B0028}"/>
+          <p:cNvPr id="2" name="Triangle 1">
+            <a:extLst>
+              <a:ext uri="{FF2B5EF4-FFF2-40B4-BE49-F238E27FC236}">
+                <a16:creationId xmlns:a16="http://schemas.microsoft.com/office/drawing/2014/main" id="{71E27C64-ED80-D94B-DE78-8419A18BE62E}"/>
               </a:ext>
             </a:extLst>
           </p:cNvPr>
@@ -5931,7 +5640,7 @@
         </p:nvSpPr>
         <p:spPr>
           <a:xfrm rot="16200000">
-            <a:off x="2842217" y="1908676"/>
+            <a:off x="892717" y="1393572"/>
             <a:ext cx="2067039" cy="1417752"/>
           </a:xfrm>
           <a:prstGeom prst="triangle">
@@ -5968,6 +5677,498 @@
           <a:p>
             <a:pPr algn="ctr"/>
             <a:endParaRPr lang="en-US"/>
+          </a:p>
+        </p:txBody>
+      </p:sp>
+      <p:sp>
+        <p:nvSpPr>
+          <p:cNvPr id="8" name="TextBox 7">
+            <a:extLst>
+              <a:ext uri="{FF2B5EF4-FFF2-40B4-BE49-F238E27FC236}">
+                <a16:creationId xmlns:a16="http://schemas.microsoft.com/office/drawing/2014/main" id="{B89A6F7B-55DF-1B64-D64E-6FD7BBEC1EE2}"/>
+              </a:ext>
+            </a:extLst>
+          </p:cNvPr>
+          <p:cNvSpPr txBox="1"/>
+          <p:nvPr/>
+        </p:nvSpPr>
+        <p:spPr>
+          <a:xfrm>
+            <a:off x="2769253" y="667005"/>
+            <a:ext cx="251387" cy="369332"/>
+          </a:xfrm>
+          <a:prstGeom prst="rect">
+            <a:avLst/>
+          </a:prstGeom>
+          <a:noFill/>
+        </p:spPr>
+        <p:txBody>
+          <a:bodyPr wrap="square" rtlCol="0">
+            <a:spAutoFit/>
+          </a:bodyPr>
+          <a:lstStyle/>
+          <a:p>
+            <a:r>
+              <a:rPr lang="en-US" i="1" dirty="0">
+                <a:solidFill>
+                  <a:schemeClr val="bg1"/>
+                </a:solidFill>
+              </a:rPr>
+              <a:t>a</a:t>
+            </a:r>
+          </a:p>
+        </p:txBody>
+      </p:sp>
+      <p:sp>
+        <p:nvSpPr>
+          <p:cNvPr id="9" name="TextBox 8">
+            <a:extLst>
+              <a:ext uri="{FF2B5EF4-FFF2-40B4-BE49-F238E27FC236}">
+                <a16:creationId xmlns:a16="http://schemas.microsoft.com/office/drawing/2014/main" id="{7C8E1627-FCAB-C459-DDE3-907832947069}"/>
+              </a:ext>
+            </a:extLst>
+          </p:cNvPr>
+          <p:cNvSpPr txBox="1"/>
+          <p:nvPr/>
+        </p:nvSpPr>
+        <p:spPr>
+          <a:xfrm>
+            <a:off x="4721509" y="662635"/>
+            <a:ext cx="251387" cy="369332"/>
+          </a:xfrm>
+          <a:prstGeom prst="rect">
+            <a:avLst/>
+          </a:prstGeom>
+          <a:noFill/>
+        </p:spPr>
+        <p:txBody>
+          <a:bodyPr wrap="square" rtlCol="0">
+            <a:spAutoFit/>
+          </a:bodyPr>
+          <a:lstStyle/>
+          <a:p>
+            <a:r>
+              <a:rPr lang="en-US" i="1" dirty="0">
+                <a:solidFill>
+                  <a:schemeClr val="bg1"/>
+                </a:solidFill>
+              </a:rPr>
+              <a:t>d</a:t>
+            </a:r>
+          </a:p>
+        </p:txBody>
+      </p:sp>
+      <p:sp>
+        <p:nvSpPr>
+          <p:cNvPr id="10" name="TextBox 9">
+            <a:extLst>
+              <a:ext uri="{FF2B5EF4-FFF2-40B4-BE49-F238E27FC236}">
+                <a16:creationId xmlns:a16="http://schemas.microsoft.com/office/drawing/2014/main" id="{06DD4240-0256-DC2B-3D21-6104A5C9EA07}"/>
+              </a:ext>
+            </a:extLst>
+          </p:cNvPr>
+          <p:cNvSpPr txBox="1"/>
+          <p:nvPr/>
+        </p:nvSpPr>
+        <p:spPr>
+          <a:xfrm>
+            <a:off x="8598933" y="1705121"/>
+            <a:ext cx="326607" cy="369332"/>
+          </a:xfrm>
+          <a:prstGeom prst="rect">
+            <a:avLst/>
+          </a:prstGeom>
+        </p:spPr>
+        <p:style>
+          <a:lnRef idx="1">
+            <a:schemeClr val="accent1"/>
+          </a:lnRef>
+          <a:fillRef idx="3">
+            <a:schemeClr val="accent1"/>
+          </a:fillRef>
+          <a:effectRef idx="2">
+            <a:schemeClr val="accent1"/>
+          </a:effectRef>
+          <a:fontRef idx="minor">
+            <a:schemeClr val="lt1"/>
+          </a:fontRef>
+        </p:style>
+        <p:txBody>
+          <a:bodyPr wrap="square" rtlCol="0">
+            <a:spAutoFit/>
+          </a:bodyPr>
+          <a:lstStyle/>
+          <a:p>
+            <a:r>
+              <a:rPr lang="en-US" i="1" dirty="0"/>
+              <a:t>b</a:t>
+            </a:r>
+          </a:p>
+        </p:txBody>
+      </p:sp>
+      <p:cxnSp>
+        <p:nvCxnSpPr>
+          <p:cNvPr id="12" name="Straight Arrow Connector 11">
+            <a:extLst>
+              <a:ext uri="{FF2B5EF4-FFF2-40B4-BE49-F238E27FC236}">
+                <a16:creationId xmlns:a16="http://schemas.microsoft.com/office/drawing/2014/main" id="{A33270E2-5B79-0BD9-83DB-AC27288B6879}"/>
+              </a:ext>
+            </a:extLst>
+          </p:cNvPr>
+          <p:cNvCxnSpPr>
+            <a:cxnSpLocks/>
+          </p:cNvCxnSpPr>
+          <p:nvPr/>
+        </p:nvCxnSpPr>
+        <p:spPr>
+          <a:xfrm>
+            <a:off x="7787363" y="1955506"/>
+            <a:ext cx="741465" cy="9274"/>
+          </a:xfrm>
+          <a:prstGeom prst="straightConnector1">
+            <a:avLst/>
+          </a:prstGeom>
+          <a:ln>
+            <a:tailEnd type="triangle"/>
+          </a:ln>
+        </p:spPr>
+        <p:style>
+          <a:lnRef idx="3">
+            <a:schemeClr val="accent4"/>
+          </a:lnRef>
+          <a:fillRef idx="0">
+            <a:schemeClr val="accent4"/>
+          </a:fillRef>
+          <a:effectRef idx="2">
+            <a:schemeClr val="accent4"/>
+          </a:effectRef>
+          <a:fontRef idx="minor">
+            <a:schemeClr val="tx1"/>
+          </a:fontRef>
+        </p:style>
+      </p:cxnSp>
+      <p:sp>
+        <p:nvSpPr>
+          <p:cNvPr id="14" name="TextBox 13">
+            <a:extLst>
+              <a:ext uri="{FF2B5EF4-FFF2-40B4-BE49-F238E27FC236}">
+                <a16:creationId xmlns:a16="http://schemas.microsoft.com/office/drawing/2014/main" id="{B145AA17-6243-2B33-66FC-AB6BB931AAD8}"/>
+              </a:ext>
+            </a:extLst>
+          </p:cNvPr>
+          <p:cNvSpPr txBox="1"/>
+          <p:nvPr/>
+        </p:nvSpPr>
+        <p:spPr>
+          <a:xfrm>
+            <a:off x="7893208" y="1938774"/>
+            <a:ext cx="689113" cy="276999"/>
+          </a:xfrm>
+          <a:prstGeom prst="rect">
+            <a:avLst/>
+          </a:prstGeom>
+          <a:noFill/>
+        </p:spPr>
+        <p:txBody>
+          <a:bodyPr wrap="square" rtlCol="0">
+            <a:spAutoFit/>
+          </a:bodyPr>
+          <a:lstStyle/>
+          <a:p>
+            <a:pPr algn="ctr"/>
+            <a:r>
+              <a:rPr lang="en-US" sz="1200" dirty="0">
+                <a:latin typeface="Cambria Math" panose="02040503050406030204" pitchFamily="18" charset="0"/>
+                <a:ea typeface="Cambria Math" panose="02040503050406030204" pitchFamily="18" charset="0"/>
+              </a:rPr>
+              <a:t>0.05</a:t>
+            </a:r>
+          </a:p>
+        </p:txBody>
+      </p:sp>
+      <p:sp>
+        <p:nvSpPr>
+          <p:cNvPr id="18" name="TextBox 17">
+            <a:extLst>
+              <a:ext uri="{FF2B5EF4-FFF2-40B4-BE49-F238E27FC236}">
+                <a16:creationId xmlns:a16="http://schemas.microsoft.com/office/drawing/2014/main" id="{03EE78A8-6C40-0273-F9BC-D7095741638F}"/>
+              </a:ext>
+            </a:extLst>
+          </p:cNvPr>
+          <p:cNvSpPr txBox="1"/>
+          <p:nvPr/>
+        </p:nvSpPr>
+        <p:spPr>
+          <a:xfrm>
+            <a:off x="10038716" y="3068799"/>
+            <a:ext cx="324330" cy="369323"/>
+          </a:xfrm>
+          <a:prstGeom prst="rect">
+            <a:avLst/>
+          </a:prstGeom>
+        </p:spPr>
+        <p:style>
+          <a:lnRef idx="1">
+            <a:schemeClr val="accent1"/>
+          </a:lnRef>
+          <a:fillRef idx="3">
+            <a:schemeClr val="accent1"/>
+          </a:fillRef>
+          <a:effectRef idx="2">
+            <a:schemeClr val="accent1"/>
+          </a:effectRef>
+          <a:fontRef idx="minor">
+            <a:schemeClr val="lt1"/>
+          </a:fontRef>
+        </p:style>
+        <p:txBody>
+          <a:bodyPr wrap="square" rtlCol="0">
+            <a:spAutoFit/>
+          </a:bodyPr>
+          <a:lstStyle/>
+          <a:p>
+            <a:r>
+              <a:rPr lang="en-US" i="1" dirty="0"/>
+              <a:t>g</a:t>
+            </a:r>
+          </a:p>
+        </p:txBody>
+      </p:sp>
+      <p:cxnSp>
+        <p:nvCxnSpPr>
+          <p:cNvPr id="19" name="Straight Arrow Connector 18">
+            <a:extLst>
+              <a:ext uri="{FF2B5EF4-FFF2-40B4-BE49-F238E27FC236}">
+                <a16:creationId xmlns:a16="http://schemas.microsoft.com/office/drawing/2014/main" id="{F4275EB3-9710-C43C-D7CC-A8DE668C0FA4}"/>
+              </a:ext>
+            </a:extLst>
+          </p:cNvPr>
+          <p:cNvCxnSpPr>
+            <a:cxnSpLocks/>
+          </p:cNvCxnSpPr>
+          <p:nvPr/>
+        </p:nvCxnSpPr>
+        <p:spPr>
+          <a:xfrm>
+            <a:off x="8959912" y="2609411"/>
+            <a:ext cx="1030969" cy="674947"/>
+          </a:xfrm>
+          <a:prstGeom prst="straightConnector1">
+            <a:avLst/>
+          </a:prstGeom>
+          <a:ln>
+            <a:tailEnd type="triangle"/>
+          </a:ln>
+        </p:spPr>
+        <p:style>
+          <a:lnRef idx="3">
+            <a:schemeClr val="accent4"/>
+          </a:lnRef>
+          <a:fillRef idx="0">
+            <a:schemeClr val="accent4"/>
+          </a:fillRef>
+          <a:effectRef idx="2">
+            <a:schemeClr val="accent4"/>
+          </a:effectRef>
+          <a:fontRef idx="minor">
+            <a:schemeClr val="tx1"/>
+          </a:fontRef>
+        </p:style>
+      </p:cxnSp>
+      <p:cxnSp>
+        <p:nvCxnSpPr>
+          <p:cNvPr id="20" name="Straight Arrow Connector 19">
+            <a:extLst>
+              <a:ext uri="{FF2B5EF4-FFF2-40B4-BE49-F238E27FC236}">
+                <a16:creationId xmlns:a16="http://schemas.microsoft.com/office/drawing/2014/main" id="{68810BD3-1563-8CE0-5D12-445A84077D3F}"/>
+              </a:ext>
+            </a:extLst>
+          </p:cNvPr>
+          <p:cNvCxnSpPr>
+            <a:cxnSpLocks/>
+          </p:cNvCxnSpPr>
+          <p:nvPr/>
+        </p:nvCxnSpPr>
+        <p:spPr>
+          <a:xfrm>
+            <a:off x="8972559" y="2116720"/>
+            <a:ext cx="1007136" cy="982849"/>
+          </a:xfrm>
+          <a:prstGeom prst="straightConnector1">
+            <a:avLst/>
+          </a:prstGeom>
+          <a:ln>
+            <a:tailEnd type="triangle"/>
+          </a:ln>
+        </p:spPr>
+        <p:style>
+          <a:lnRef idx="3">
+            <a:schemeClr val="accent4"/>
+          </a:lnRef>
+          <a:fillRef idx="0">
+            <a:schemeClr val="accent4"/>
+          </a:fillRef>
+          <a:effectRef idx="2">
+            <a:schemeClr val="accent4"/>
+          </a:effectRef>
+          <a:fontRef idx="minor">
+            <a:schemeClr val="tx1"/>
+          </a:fontRef>
+        </p:style>
+      </p:cxnSp>
+      <p:sp>
+        <p:nvSpPr>
+          <p:cNvPr id="23" name="TextBox 22">
+            <a:extLst>
+              <a:ext uri="{FF2B5EF4-FFF2-40B4-BE49-F238E27FC236}">
+                <a16:creationId xmlns:a16="http://schemas.microsoft.com/office/drawing/2014/main" id="{8BF3ED4C-767B-6706-45D6-E02EF2E27A63}"/>
+              </a:ext>
+            </a:extLst>
+          </p:cNvPr>
+          <p:cNvSpPr txBox="1"/>
+          <p:nvPr/>
+        </p:nvSpPr>
+        <p:spPr>
+          <a:xfrm rot="2041178">
+            <a:off x="9095923" y="2953995"/>
+            <a:ext cx="689113" cy="276999"/>
+          </a:xfrm>
+          <a:prstGeom prst="rect">
+            <a:avLst/>
+          </a:prstGeom>
+          <a:noFill/>
+        </p:spPr>
+        <p:txBody>
+          <a:bodyPr wrap="square" rtlCol="0">
+            <a:spAutoFit/>
+          </a:bodyPr>
+          <a:lstStyle/>
+          <a:p>
+            <a:pPr algn="ctr"/>
+            <a:r>
+              <a:rPr lang="en-US" sz="1200" dirty="0">
+                <a:latin typeface="Cambria Math" panose="02040503050406030204" pitchFamily="18" charset="0"/>
+                <a:ea typeface="Cambria Math" panose="02040503050406030204" pitchFamily="18" charset="0"/>
+              </a:rPr>
+              <a:t>0.02</a:t>
+            </a:r>
+          </a:p>
+        </p:txBody>
+      </p:sp>
+      <p:sp>
+        <p:nvSpPr>
+          <p:cNvPr id="30" name="TextBox 29">
+            <a:extLst>
+              <a:ext uri="{FF2B5EF4-FFF2-40B4-BE49-F238E27FC236}">
+                <a16:creationId xmlns:a16="http://schemas.microsoft.com/office/drawing/2014/main" id="{8D82AAA5-0EF5-1CEF-05F1-D1E6CA901829}"/>
+              </a:ext>
+            </a:extLst>
+          </p:cNvPr>
+          <p:cNvSpPr txBox="1"/>
+          <p:nvPr/>
+        </p:nvSpPr>
+        <p:spPr>
+          <a:xfrm rot="19518364">
+            <a:off x="8970697" y="1264622"/>
+            <a:ext cx="689113" cy="276999"/>
+          </a:xfrm>
+          <a:prstGeom prst="rect">
+            <a:avLst/>
+          </a:prstGeom>
+          <a:noFill/>
+        </p:spPr>
+        <p:txBody>
+          <a:bodyPr wrap="square" rtlCol="0">
+            <a:spAutoFit/>
+          </a:bodyPr>
+          <a:lstStyle/>
+          <a:p>
+            <a:pPr algn="ctr"/>
+            <a:r>
+              <a:rPr lang="en-US" sz="1200" dirty="0">
+                <a:latin typeface="Cambria Math" panose="02040503050406030204" pitchFamily="18" charset="0"/>
+                <a:ea typeface="Cambria Math" panose="02040503050406030204" pitchFamily="18" charset="0"/>
+              </a:rPr>
+              <a:t>0.94</a:t>
+            </a:r>
+          </a:p>
+        </p:txBody>
+      </p:sp>
+      <p:sp>
+        <p:nvSpPr>
+          <p:cNvPr id="31" name="TextBox 30">
+            <a:extLst>
+              <a:ext uri="{FF2B5EF4-FFF2-40B4-BE49-F238E27FC236}">
+                <a16:creationId xmlns:a16="http://schemas.microsoft.com/office/drawing/2014/main" id="{A746F930-F3B9-1B58-2050-D1DA8C79C2ED}"/>
+              </a:ext>
+            </a:extLst>
+          </p:cNvPr>
+          <p:cNvSpPr txBox="1"/>
+          <p:nvPr/>
+        </p:nvSpPr>
+        <p:spPr>
+          <a:xfrm rot="18989321">
+            <a:off x="9217757" y="1453992"/>
+            <a:ext cx="689113" cy="276999"/>
+          </a:xfrm>
+          <a:prstGeom prst="rect">
+            <a:avLst/>
+          </a:prstGeom>
+          <a:noFill/>
+        </p:spPr>
+        <p:txBody>
+          <a:bodyPr wrap="square" rtlCol="0">
+            <a:spAutoFit/>
+          </a:bodyPr>
+          <a:lstStyle/>
+          <a:p>
+            <a:pPr algn="ctr"/>
+            <a:r>
+              <a:rPr lang="en-US" sz="1200" dirty="0">
+                <a:latin typeface="Cambria Math" panose="02040503050406030204" pitchFamily="18" charset="0"/>
+                <a:ea typeface="Cambria Math" panose="02040503050406030204" pitchFamily="18" charset="0"/>
+              </a:rPr>
+              <a:t>0.94</a:t>
+            </a:r>
+          </a:p>
+        </p:txBody>
+      </p:sp>
+      <p:sp>
+        <p:nvSpPr>
+          <p:cNvPr id="32" name="TextBox 31">
+            <a:extLst>
+              <a:ext uri="{FF2B5EF4-FFF2-40B4-BE49-F238E27FC236}">
+                <a16:creationId xmlns:a16="http://schemas.microsoft.com/office/drawing/2014/main" id="{B304C9AD-8867-CA96-93F8-78D489656FCF}"/>
+              </a:ext>
+            </a:extLst>
+          </p:cNvPr>
+          <p:cNvSpPr txBox="1"/>
+          <p:nvPr/>
+        </p:nvSpPr>
+        <p:spPr>
+          <a:xfrm rot="2652772">
+            <a:off x="9508894" y="2687673"/>
+            <a:ext cx="689113" cy="276999"/>
+          </a:xfrm>
+          <a:prstGeom prst="rect">
+            <a:avLst/>
+          </a:prstGeom>
+          <a:noFill/>
+        </p:spPr>
+        <p:txBody>
+          <a:bodyPr wrap="square" rtlCol="0">
+            <a:spAutoFit/>
+          </a:bodyPr>
+          <a:lstStyle/>
+          <a:p>
+            <a:pPr algn="ctr"/>
+            <a:r>
+              <a:rPr lang="en-US" sz="1200" dirty="0">
+                <a:latin typeface="Cambria Math" panose="02040503050406030204" pitchFamily="18" charset="0"/>
+                <a:ea typeface="Cambria Math" panose="02040503050406030204" pitchFamily="18" charset="0"/>
+              </a:rPr>
+              <a:t>0.02</a:t>
+            </a:r>
           </a:p>
         </p:txBody>
       </p:sp>

</xml_diff>